<commit_message>
-added slide to ppt
</commit_message>
<xml_diff>
--- a/Using the ChatGPT API in R.pptx
+++ b/Using the ChatGPT API in R.pptx
@@ -5,16 +5,17 @@
     <p:sldMasterId id="2147483648" r:id="rId4"/>
   </p:sldMasterIdLst>
   <p:notesMasterIdLst>
-    <p:notesMasterId r:id="rId12"/>
+    <p:notesMasterId r:id="rId13"/>
   </p:notesMasterIdLst>
   <p:sldIdLst>
     <p:sldId id="256" r:id="rId5"/>
     <p:sldId id="2460" r:id="rId6"/>
     <p:sldId id="258" r:id="rId7"/>
-    <p:sldId id="2461" r:id="rId8"/>
-    <p:sldId id="2459" r:id="rId9"/>
-    <p:sldId id="266" r:id="rId10"/>
-    <p:sldId id="267" r:id="rId11"/>
+    <p:sldId id="2462" r:id="rId8"/>
+    <p:sldId id="2461" r:id="rId9"/>
+    <p:sldId id="2459" r:id="rId10"/>
+    <p:sldId id="266" r:id="rId11"/>
+    <p:sldId id="267" r:id="rId12"/>
   </p:sldIdLst>
   <p:sldSz cx="12192000" cy="6858000"/>
   <p:notesSz cx="6858000" cy="9144000"/>
@@ -131,6 +132,240 @@
 <p:cmAuthorLst xmlns:a="http://schemas.openxmlformats.org/drawingml/2006/main" xmlns:r="http://schemas.openxmlformats.org/officeDocument/2006/relationships" xmlns:p="http://schemas.openxmlformats.org/presentationml/2006/main">
   <p:cmAuthor id="3" name="Author" initials="A" lastIdx="0" clrIdx="2"/>
 </p:cmAuthorLst>
+</file>
+
+<file path=ppt/revisionInfo.xml><?xml version="1.0" encoding="utf-8"?>
+<p1510:revInfo xmlns:a="http://schemas.openxmlformats.org/drawingml/2006/main" xmlns:r="http://schemas.openxmlformats.org/officeDocument/2006/relationships" xmlns:p1510="http://schemas.microsoft.com/office/powerpoint/2015/10/main">
+  <p1510:revLst>
+    <p1510:client id="{50867FD3-69F2-4FCF-80F6-B3083FB7E5C8}" v="2" dt="2023-06-14T21:03:19.418"/>
+  </p1510:revLst>
+</p1510:revInfo>
+</file>
+
+<file path=ppt/changesInfos/changesInfo1.xml><?xml version="1.0" encoding="utf-8"?>
+<pc:chgInfo xmlns:a="http://schemas.openxmlformats.org/drawingml/2006/main" xmlns:r="http://schemas.openxmlformats.org/officeDocument/2006/relationships" xmlns:ac="http://schemas.microsoft.com/office/drawing/2013/main/command" xmlns:pc="http://schemas.microsoft.com/office/powerpoint/2013/main/command">
+  <pc:docChgLst>
+    <pc:chgData name="Abigail Haddad" userId="06abbf542644cb8d" providerId="LiveId" clId="{50867FD3-69F2-4FCF-80F6-B3083FB7E5C8}"/>
+    <pc:docChg chg="undo custSel addSld delSld modSld">
+      <pc:chgData name="Abigail Haddad" userId="06abbf542644cb8d" providerId="LiveId" clId="{50867FD3-69F2-4FCF-80F6-B3083FB7E5C8}" dt="2023-06-14T21:15:58.638" v="486" actId="47"/>
+      <pc:docMkLst>
+        <pc:docMk/>
+      </pc:docMkLst>
+      <pc:sldChg chg="modSp mod">
+        <pc:chgData name="Abigail Haddad" userId="06abbf542644cb8d" providerId="LiveId" clId="{50867FD3-69F2-4FCF-80F6-B3083FB7E5C8}" dt="2023-06-14T21:15:16.198" v="485" actId="20577"/>
+        <pc:sldMkLst>
+          <pc:docMk/>
+          <pc:sldMk cId="2356725268" sldId="2460"/>
+        </pc:sldMkLst>
+        <pc:spChg chg="mod">
+          <ac:chgData name="Abigail Haddad" userId="06abbf542644cb8d" providerId="LiveId" clId="{50867FD3-69F2-4FCF-80F6-B3083FB7E5C8}" dt="2023-06-14T21:15:16.198" v="485" actId="20577"/>
+          <ac:spMkLst>
+            <pc:docMk/>
+            <pc:sldMk cId="2356725268" sldId="2460"/>
+            <ac:spMk id="3" creationId="{7E7784B9-337E-B4B5-2980-1C120488DF42}"/>
+          </ac:spMkLst>
+        </pc:spChg>
+      </pc:sldChg>
+      <pc:sldChg chg="modSp mod">
+        <pc:chgData name="Abigail Haddad" userId="06abbf542644cb8d" providerId="LiveId" clId="{50867FD3-69F2-4FCF-80F6-B3083FB7E5C8}" dt="2023-06-12T01:54:21.400" v="38" actId="20577"/>
+        <pc:sldMkLst>
+          <pc:docMk/>
+          <pc:sldMk cId="2478564143" sldId="2461"/>
+        </pc:sldMkLst>
+        <pc:spChg chg="mod">
+          <ac:chgData name="Abigail Haddad" userId="06abbf542644cb8d" providerId="LiveId" clId="{50867FD3-69F2-4FCF-80F6-B3083FB7E5C8}" dt="2023-06-12T01:54:09.935" v="10" actId="20577"/>
+          <ac:spMkLst>
+            <pc:docMk/>
+            <pc:sldMk cId="2478564143" sldId="2461"/>
+            <ac:spMk id="4" creationId="{3E56AFBE-E0BD-BBC7-92EB-CB17B52AF306}"/>
+          </ac:spMkLst>
+        </pc:spChg>
+        <pc:spChg chg="mod">
+          <ac:chgData name="Abigail Haddad" userId="06abbf542644cb8d" providerId="LiveId" clId="{50867FD3-69F2-4FCF-80F6-B3083FB7E5C8}" dt="2023-06-12T01:54:21.400" v="38" actId="20577"/>
+          <ac:spMkLst>
+            <pc:docMk/>
+            <pc:sldMk cId="2478564143" sldId="2461"/>
+            <ac:spMk id="5" creationId="{BD490393-017C-6D1E-8D75-8B9883A498D1}"/>
+          </ac:spMkLst>
+        </pc:spChg>
+      </pc:sldChg>
+      <pc:sldChg chg="addSp delSp modSp new mod modClrScheme chgLayout">
+        <pc:chgData name="Abigail Haddad" userId="06abbf542644cb8d" providerId="LiveId" clId="{50867FD3-69F2-4FCF-80F6-B3083FB7E5C8}" dt="2023-06-14T21:13:19.576" v="417" actId="20577"/>
+        <pc:sldMkLst>
+          <pc:docMk/>
+          <pc:sldMk cId="409617130" sldId="2462"/>
+        </pc:sldMkLst>
+        <pc:spChg chg="mod">
+          <ac:chgData name="Abigail Haddad" userId="06abbf542644cb8d" providerId="LiveId" clId="{50867FD3-69F2-4FCF-80F6-B3083FB7E5C8}" dt="2023-06-14T21:13:19.576" v="417" actId="20577"/>
+          <ac:spMkLst>
+            <pc:docMk/>
+            <pc:sldMk cId="409617130" sldId="2462"/>
+            <ac:spMk id="2" creationId="{3046B5E8-176A-5A8E-AA11-EC80E7B19DEB}"/>
+          </ac:spMkLst>
+        </pc:spChg>
+        <pc:spChg chg="del mod">
+          <ac:chgData name="Abigail Haddad" userId="06abbf542644cb8d" providerId="LiveId" clId="{50867FD3-69F2-4FCF-80F6-B3083FB7E5C8}" dt="2023-06-14T21:12:28.155" v="337" actId="22"/>
+          <ac:spMkLst>
+            <pc:docMk/>
+            <pc:sldMk cId="409617130" sldId="2462"/>
+            <ac:spMk id="3" creationId="{C800670A-5276-9045-C29E-C6FBE0B3CE40}"/>
+          </ac:spMkLst>
+        </pc:spChg>
+        <pc:spChg chg="mod">
+          <ac:chgData name="Abigail Haddad" userId="06abbf542644cb8d" providerId="LiveId" clId="{50867FD3-69F2-4FCF-80F6-B3083FB7E5C8}" dt="2023-06-14T21:12:38.386" v="339" actId="26606"/>
+          <ac:spMkLst>
+            <pc:docMk/>
+            <pc:sldMk cId="409617130" sldId="2462"/>
+            <ac:spMk id="4" creationId="{F4E15B5F-AB78-228E-65EA-69F48E0DC51E}"/>
+          </ac:spMkLst>
+        </pc:spChg>
+        <pc:spChg chg="mod">
+          <ac:chgData name="Abigail Haddad" userId="06abbf542644cb8d" providerId="LiveId" clId="{50867FD3-69F2-4FCF-80F6-B3083FB7E5C8}" dt="2023-06-14T21:12:38.386" v="339" actId="26606"/>
+          <ac:spMkLst>
+            <pc:docMk/>
+            <pc:sldMk cId="409617130" sldId="2462"/>
+            <ac:spMk id="5" creationId="{E14E1BE6-A5B6-F39D-D150-9D10AA2F27D2}"/>
+          </ac:spMkLst>
+        </pc:spChg>
+        <pc:spChg chg="mod">
+          <ac:chgData name="Abigail Haddad" userId="06abbf542644cb8d" providerId="LiveId" clId="{50867FD3-69F2-4FCF-80F6-B3083FB7E5C8}" dt="2023-06-14T21:12:38.386" v="339" actId="26606"/>
+          <ac:spMkLst>
+            <pc:docMk/>
+            <pc:sldMk cId="409617130" sldId="2462"/>
+            <ac:spMk id="6" creationId="{67EA06B3-03CB-AFC8-C58D-9D296D8E1646}"/>
+          </ac:spMkLst>
+        </pc:spChg>
+        <pc:spChg chg="add del mod">
+          <ac:chgData name="Abigail Haddad" userId="06abbf542644cb8d" providerId="LiveId" clId="{50867FD3-69F2-4FCF-80F6-B3083FB7E5C8}" dt="2023-06-14T21:03:19.418" v="289"/>
+          <ac:spMkLst>
+            <pc:docMk/>
+            <pc:sldMk cId="409617130" sldId="2462"/>
+            <ac:spMk id="7" creationId="{27320F9F-0E6B-B95B-31B6-E89C116FF8DA}"/>
+          </ac:spMkLst>
+        </pc:spChg>
+        <pc:spChg chg="add mod">
+          <ac:chgData name="Abigail Haddad" userId="06abbf542644cb8d" providerId="LiveId" clId="{50867FD3-69F2-4FCF-80F6-B3083FB7E5C8}" dt="2023-06-14T21:13:14.416" v="393" actId="20577"/>
+          <ac:spMkLst>
+            <pc:docMk/>
+            <pc:sldMk cId="409617130" sldId="2462"/>
+            <ac:spMk id="18" creationId="{12DF2BFA-49FA-8914-0FCC-9F8D633CEDFC}"/>
+          </ac:spMkLst>
+        </pc:spChg>
+        <pc:spChg chg="add mod">
+          <ac:chgData name="Abigail Haddad" userId="06abbf542644cb8d" providerId="LiveId" clId="{50867FD3-69F2-4FCF-80F6-B3083FB7E5C8}" dt="2023-06-14T21:13:05.095" v="368" actId="20577"/>
+          <ac:spMkLst>
+            <pc:docMk/>
+            <pc:sldMk cId="409617130" sldId="2462"/>
+            <ac:spMk id="20" creationId="{9A28403A-28E6-70A5-F24D-76B1928B7838}"/>
+          </ac:spMkLst>
+        </pc:spChg>
+        <pc:picChg chg="add del mod">
+          <ac:chgData name="Abigail Haddad" userId="06abbf542644cb8d" providerId="LiveId" clId="{50867FD3-69F2-4FCF-80F6-B3083FB7E5C8}" dt="2023-06-14T21:08:39.105" v="297" actId="22"/>
+          <ac:picMkLst>
+            <pc:docMk/>
+            <pc:sldMk cId="409617130" sldId="2462"/>
+            <ac:picMk id="9" creationId="{1FC24D03-0EB0-4FAD-73C0-D5B64616DA12}"/>
+          </ac:picMkLst>
+        </pc:picChg>
+        <pc:picChg chg="add mod ord">
+          <ac:chgData name="Abigail Haddad" userId="06abbf542644cb8d" providerId="LiveId" clId="{50867FD3-69F2-4FCF-80F6-B3083FB7E5C8}" dt="2023-06-14T21:12:46.525" v="341" actId="1076"/>
+          <ac:picMkLst>
+            <pc:docMk/>
+            <pc:sldMk cId="409617130" sldId="2462"/>
+            <ac:picMk id="11" creationId="{ABB17A2E-0CA6-2E8D-924D-1CF8D3DC5FFC}"/>
+          </ac:picMkLst>
+        </pc:picChg>
+        <pc:picChg chg="add mod ord">
+          <ac:chgData name="Abigail Haddad" userId="06abbf542644cb8d" providerId="LiveId" clId="{50867FD3-69F2-4FCF-80F6-B3083FB7E5C8}" dt="2023-06-14T21:12:50.141" v="342" actId="1076"/>
+          <ac:picMkLst>
+            <pc:docMk/>
+            <pc:sldMk cId="409617130" sldId="2462"/>
+            <ac:picMk id="13" creationId="{06ED7FF6-E8FD-12AC-EA58-4629E0105C07}"/>
+          </ac:picMkLst>
+        </pc:picChg>
+      </pc:sldChg>
+      <pc:sldChg chg="addSp delSp modSp new del mod modClrScheme chgLayout">
+        <pc:chgData name="Abigail Haddad" userId="06abbf542644cb8d" providerId="LiveId" clId="{50867FD3-69F2-4FCF-80F6-B3083FB7E5C8}" dt="2023-06-14T21:15:58.638" v="486" actId="47"/>
+        <pc:sldMkLst>
+          <pc:docMk/>
+          <pc:sldMk cId="1991759866" sldId="2463"/>
+        </pc:sldMkLst>
+        <pc:spChg chg="del">
+          <ac:chgData name="Abigail Haddad" userId="06abbf542644cb8d" providerId="LiveId" clId="{50867FD3-69F2-4FCF-80F6-B3083FB7E5C8}" dt="2023-06-14T21:02:20.297" v="276" actId="26606"/>
+          <ac:spMkLst>
+            <pc:docMk/>
+            <pc:sldMk cId="1991759866" sldId="2463"/>
+            <ac:spMk id="2" creationId="{4CEA895A-4E01-83A7-0C81-CA74E23A3A07}"/>
+          </ac:spMkLst>
+        </pc:spChg>
+        <pc:spChg chg="mod">
+          <ac:chgData name="Abigail Haddad" userId="06abbf542644cb8d" providerId="LiveId" clId="{50867FD3-69F2-4FCF-80F6-B3083FB7E5C8}" dt="2023-06-14T21:02:47.003" v="278" actId="21"/>
+          <ac:spMkLst>
+            <pc:docMk/>
+            <pc:sldMk cId="1991759866" sldId="2463"/>
+            <ac:spMk id="3" creationId="{E204D217-6D4D-9E15-17B8-ABD930D55818}"/>
+          </ac:spMkLst>
+        </pc:spChg>
+        <pc:spChg chg="mod">
+          <ac:chgData name="Abigail Haddad" userId="06abbf542644cb8d" providerId="LiveId" clId="{50867FD3-69F2-4FCF-80F6-B3083FB7E5C8}" dt="2023-06-14T21:02:20.297" v="276" actId="26606"/>
+          <ac:spMkLst>
+            <pc:docMk/>
+            <pc:sldMk cId="1991759866" sldId="2463"/>
+            <ac:spMk id="4" creationId="{C10C8EE6-DA48-DC9B-7C0F-6C890B9E5563}"/>
+          </ac:spMkLst>
+        </pc:spChg>
+        <pc:spChg chg="mod">
+          <ac:chgData name="Abigail Haddad" userId="06abbf542644cb8d" providerId="LiveId" clId="{50867FD3-69F2-4FCF-80F6-B3083FB7E5C8}" dt="2023-06-14T21:02:20.297" v="276" actId="26606"/>
+          <ac:spMkLst>
+            <pc:docMk/>
+            <pc:sldMk cId="1991759866" sldId="2463"/>
+            <ac:spMk id="5" creationId="{6130D500-9797-09B1-F731-F661CB6EF6BC}"/>
+          </ac:spMkLst>
+        </pc:spChg>
+        <pc:spChg chg="mod">
+          <ac:chgData name="Abigail Haddad" userId="06abbf542644cb8d" providerId="LiveId" clId="{50867FD3-69F2-4FCF-80F6-B3083FB7E5C8}" dt="2023-06-14T21:02:20.297" v="276" actId="26606"/>
+          <ac:spMkLst>
+            <pc:docMk/>
+            <pc:sldMk cId="1991759866" sldId="2463"/>
+            <ac:spMk id="6" creationId="{4F59CCBB-CC9F-F019-17DB-94ACE709347B}"/>
+          </ac:spMkLst>
+        </pc:spChg>
+        <pc:spChg chg="add mod">
+          <ac:chgData name="Abigail Haddad" userId="06abbf542644cb8d" providerId="LiveId" clId="{50867FD3-69F2-4FCF-80F6-B3083FB7E5C8}" dt="2023-06-14T21:02:20.297" v="276" actId="26606"/>
+          <ac:spMkLst>
+            <pc:docMk/>
+            <pc:sldMk cId="1991759866" sldId="2463"/>
+            <ac:spMk id="11" creationId="{5398CF7D-58A3-1346-931C-1D9AAECBB96D}"/>
+          </ac:spMkLst>
+        </pc:spChg>
+        <pc:spChg chg="add mod">
+          <ac:chgData name="Abigail Haddad" userId="06abbf542644cb8d" providerId="LiveId" clId="{50867FD3-69F2-4FCF-80F6-B3083FB7E5C8}" dt="2023-06-14T21:02:20.297" v="276" actId="26606"/>
+          <ac:spMkLst>
+            <pc:docMk/>
+            <pc:sldMk cId="1991759866" sldId="2463"/>
+            <ac:spMk id="13" creationId="{881B938B-92AB-95BC-90C4-3E920757D619}"/>
+          </ac:spMkLst>
+        </pc:spChg>
+        <pc:spChg chg="add mod">
+          <ac:chgData name="Abigail Haddad" userId="06abbf542644cb8d" providerId="LiveId" clId="{50867FD3-69F2-4FCF-80F6-B3083FB7E5C8}" dt="2023-06-14T21:02:20.297" v="276" actId="26606"/>
+          <ac:spMkLst>
+            <pc:docMk/>
+            <pc:sldMk cId="1991759866" sldId="2463"/>
+            <ac:spMk id="15" creationId="{9CB4BB83-9C44-0A06-1405-B6CA62D038F1}"/>
+          </ac:spMkLst>
+        </pc:spChg>
+        <pc:spChg chg="add mod">
+          <ac:chgData name="Abigail Haddad" userId="06abbf542644cb8d" providerId="LiveId" clId="{50867FD3-69F2-4FCF-80F6-B3083FB7E5C8}" dt="2023-06-14T21:02:20.297" v="276" actId="26606"/>
+          <ac:spMkLst>
+            <pc:docMk/>
+            <pc:sldMk cId="1991759866" sldId="2463"/>
+            <ac:spMk id="17" creationId="{BFECA82A-CAC6-C22E-3B29-80270E3DC37B}"/>
+          </ac:spMkLst>
+        </pc:spChg>
+      </pc:sldChg>
+    </pc:docChg>
+  </pc:docChgLst>
+</pc:chgInfo>
 </file>
 
 <file path=ppt/notesMasters/notesMaster1.xml><?xml version="1.0" encoding="utf-8"?>
@@ -13060,34 +13295,36 @@
           <a:lstStyle/>
           <a:p>
             <a:r>
-              <a:rPr lang="en-US" dirty="0"/>
-              <a:t>The </a:t>
-            </a:r>
-            <a:r>
-              <a:rPr lang="en-US" dirty="0" err="1"/>
+              <a:rPr lang="en-US" b="0" i="0" dirty="0">
+                <a:solidFill>
+                  <a:srgbClr val="374151"/>
+                </a:solidFill>
+                <a:effectLst/>
+                <a:latin typeface="Söhne"/>
+              </a:rPr>
+              <a:t>When using a single prompt across different pieces of text, use the </a:t>
+            </a:r>
+            <a:r>
+              <a:rPr lang="en-US" b="0" i="0" dirty="0" err="1">
+                <a:solidFill>
+                  <a:srgbClr val="374151"/>
+                </a:solidFill>
+                <a:effectLst/>
+                <a:latin typeface="Söhne"/>
+              </a:rPr>
               <a:t>ChatGPT</a:t>
             </a:r>
             <a:r>
-              <a:rPr lang="en-US" dirty="0"/>
-              <a:t> API might be useful for your Natural Language Processing project.</a:t>
-            </a:r>
-          </a:p>
-          <a:p>
+              <a:rPr lang="en-US" b="0" i="0" dirty="0">
+                <a:solidFill>
+                  <a:srgbClr val="374151"/>
+                </a:solidFill>
+                <a:effectLst/>
+                <a:latin typeface="Söhne"/>
+              </a:rPr>
+              <a:t> API</a:t>
+            </a:r>
             <a:endParaRPr lang="en-US" dirty="0"/>
-          </a:p>
-          <a:p>
-            <a:r>
-              <a:rPr lang="en-US" dirty="0"/>
-              <a:t>You can get started with a very small amount of code using the R library called </a:t>
-            </a:r>
-            <a:r>
-              <a:rPr lang="en-US" dirty="0" err="1"/>
-              <a:t>openai</a:t>
-            </a:r>
-            <a:r>
-              <a:rPr lang="en-US" dirty="0"/>
-              <a:t>.</a:t>
-            </a:r>
           </a:p>
         </p:txBody>
       </p:sp>
@@ -13507,10 +13744,76 @@
       </p:grpSpPr>
       <p:sp>
         <p:nvSpPr>
+          <p:cNvPr id="2" name="Title 1">
+            <a:extLst>
+              <a:ext uri="{FF2B5EF4-FFF2-40B4-BE49-F238E27FC236}">
+                <a16:creationId xmlns:a16="http://schemas.microsoft.com/office/drawing/2014/main" id="{3046B5E8-176A-5A8E-AA11-EC80E7B19DEB}"/>
+              </a:ext>
+            </a:extLst>
+          </p:cNvPr>
+          <p:cNvSpPr>
+            <a:spLocks noGrp="1"/>
+          </p:cNvSpPr>
+          <p:nvPr>
+            <p:ph type="title"/>
+          </p:nvPr>
+        </p:nvSpPr>
+        <p:spPr>
+          <a:xfrm>
+            <a:off x="1167492" y="381000"/>
+            <a:ext cx="9779183" cy="1325563"/>
+          </a:xfrm>
+        </p:spPr>
+        <p:txBody>
+          <a:bodyPr anchor="b">
+            <a:normAutofit/>
+          </a:bodyPr>
+          <a:lstStyle/>
+          <a:p>
+            <a:r>
+              <a:rPr lang="en-US" dirty="0"/>
+              <a:t>Example Input and Output</a:t>
+            </a:r>
+          </a:p>
+        </p:txBody>
+      </p:sp>
+      <p:pic>
+        <p:nvPicPr>
+          <p:cNvPr id="11" name="Picture 10">
+            <a:extLst>
+              <a:ext uri="{FF2B5EF4-FFF2-40B4-BE49-F238E27FC236}">
+                <a16:creationId xmlns:a16="http://schemas.microsoft.com/office/drawing/2014/main" id="{ABB17A2E-0CA6-2E8D-924D-1CF8D3DC5FFC}"/>
+              </a:ext>
+            </a:extLst>
+          </p:cNvPr>
+          <p:cNvPicPr>
+            <a:picLocks noChangeAspect="1"/>
+          </p:cNvPicPr>
+          <p:nvPr/>
+        </p:nvPicPr>
+        <p:blipFill>
+          <a:blip r:embed="rId2"/>
+          <a:stretch>
+            <a:fillRect/>
+          </a:stretch>
+        </p:blipFill>
+        <p:spPr>
+          <a:xfrm>
+            <a:off x="6283235" y="2827329"/>
+            <a:ext cx="4159725" cy="2828613"/>
+          </a:xfrm>
+          <a:prstGeom prst="rect">
+            <a:avLst/>
+          </a:prstGeom>
+          <a:noFill/>
+        </p:spPr>
+      </p:pic>
+      <p:sp>
+        <p:nvSpPr>
           <p:cNvPr id="4" name="Date Placeholder 3">
             <a:extLst>
               <a:ext uri="{FF2B5EF4-FFF2-40B4-BE49-F238E27FC236}">
-                <a16:creationId xmlns:a16="http://schemas.microsoft.com/office/drawing/2014/main" id="{3E56AFBE-E0BD-BBC7-92EB-CB17B52AF306}"/>
+                <a16:creationId xmlns:a16="http://schemas.microsoft.com/office/drawing/2014/main" id="{F4E15B5F-AB78-228E-65EA-69F48E0DC51E}"/>
               </a:ext>
             </a:extLst>
           </p:cNvPr>
@@ -13521,17 +13824,33 @@
             <p:ph type="dt" sz="half" idx="2"/>
           </p:nvPr>
         </p:nvSpPr>
-        <p:spPr/>
-        <p:txBody>
-          <a:bodyPr/>
+        <p:spPr>
+          <a:xfrm>
+            <a:off x="381000" y="6356350"/>
+            <a:ext cx="2743200" cy="365125"/>
+          </a:xfrm>
+        </p:spPr>
+        <p:txBody>
+          <a:bodyPr anchor="ctr">
+            <a:normAutofit/>
+          </a:bodyPr>
           <a:lstStyle/>
           <a:p>
-            <a:fld id="{4B103E64-1627-9140-8127-1849FED275E1}" type="datetime1">
+            <a:pPr>
+              <a:spcAft>
+                <a:spcPts val="600"/>
+              </a:spcAft>
+            </a:pPr>
+            <a:fld id="{7E7AB22C-8B7E-9B4A-8C65-396C3C874D86}" type="datetime1">
               <a:rPr lang="en-US" smtClean="0"/>
-              <a:pPr/>
-              <a:t>6/11/2023</a:t>
+              <a:pPr>
+                <a:spcAft>
+                  <a:spcPts val="600"/>
+                </a:spcAft>
+              </a:pPr>
+              <a:t>6/14/2023</a:t>
             </a:fld>
-            <a:endParaRPr lang="en-US" dirty="0"/>
+            <a:endParaRPr lang="en-US"/>
           </a:p>
         </p:txBody>
       </p:sp>
@@ -13540,7 +13859,7 @@
           <p:cNvPr id="5" name="Footer Placeholder 4">
             <a:extLst>
               <a:ext uri="{FF2B5EF4-FFF2-40B4-BE49-F238E27FC236}">
-                <a16:creationId xmlns:a16="http://schemas.microsoft.com/office/drawing/2014/main" id="{BD490393-017C-6D1E-8D75-8B9883A498D1}"/>
+                <a16:creationId xmlns:a16="http://schemas.microsoft.com/office/drawing/2014/main" id="{E14E1BE6-A5B6-F39D-D150-9D10AA2F27D2}"/>
               </a:ext>
             </a:extLst>
           </p:cNvPr>
@@ -13551,60 +13870,45 @@
             <p:ph type="ftr" sz="quarter" idx="3"/>
           </p:nvPr>
         </p:nvSpPr>
-        <p:spPr/>
-        <p:txBody>
-          <a:bodyPr/>
+        <p:spPr>
+          <a:xfrm>
+            <a:off x="4038600" y="6356350"/>
+            <a:ext cx="4114800" cy="365125"/>
+          </a:xfrm>
+        </p:spPr>
+        <p:txBody>
+          <a:bodyPr anchor="ctr">
+            <a:normAutofit/>
+          </a:bodyPr>
           <a:lstStyle/>
           <a:p>
-            <a:r>
-              <a:rPr lang="en-US"/>
-              <a:t>PRESENTATION TITLE</a:t>
-            </a:r>
-            <a:endParaRPr lang="en-US" dirty="0"/>
-          </a:p>
-        </p:txBody>
-      </p:sp>
-      <p:pic>
-        <p:nvPicPr>
-          <p:cNvPr id="14" name="Content Placeholder 13" descr="Table outline">
-            <a:extLst>
-              <a:ext uri="{FF2B5EF4-FFF2-40B4-BE49-F238E27FC236}">
-                <a16:creationId xmlns:a16="http://schemas.microsoft.com/office/drawing/2014/main" id="{58F3B669-3989-B0A6-B19A-731580FBC919}"/>
-              </a:ext>
-            </a:extLst>
-          </p:cNvPr>
-          <p:cNvPicPr>
-            <a:picLocks noGrp="1" noChangeAspect="1"/>
-          </p:cNvPicPr>
-          <p:nvPr>
-            <p:ph idx="13"/>
-          </p:nvPr>
-        </p:nvPicPr>
-        <p:blipFill>
-          <a:blip r:embed="rId2">
-            <a:extLst>
-              <a:ext uri="{96DAC541-7B7A-43D3-8B79-37D633B846F1}">
-                <asvg:svgBlip xmlns:asvg="http://schemas.microsoft.com/office/drawing/2016/SVG/main" r:embed="rId3"/>
-              </a:ext>
-            </a:extLst>
-          </a:blip>
-          <a:stretch>
-            <a:fillRect/>
-          </a:stretch>
-        </p:blipFill>
-        <p:spPr>
-          <a:xfrm>
-            <a:off x="8397660" y="2652792"/>
-            <a:ext cx="1755616" cy="1755616"/>
-          </a:xfrm>
-        </p:spPr>
-      </p:pic>
-      <p:sp>
-        <p:nvSpPr>
-          <p:cNvPr id="11" name="Slide Number Placeholder 10">
-            <a:extLst>
-              <a:ext uri="{FF2B5EF4-FFF2-40B4-BE49-F238E27FC236}">
-                <a16:creationId xmlns:a16="http://schemas.microsoft.com/office/drawing/2014/main" id="{F07D5E45-46E9-2D84-CEFF-330AB2A2B0A0}"/>
+            <a:pPr>
+              <a:spcAft>
+                <a:spcPts val="600"/>
+              </a:spcAft>
+            </a:pPr>
+            <a:r>
+              <a:rPr lang="en-US" dirty="0"/>
+              <a:t>Using the </a:t>
+            </a:r>
+            <a:r>
+              <a:rPr lang="en-US" dirty="0" err="1"/>
+              <a:t>ChatGPT</a:t>
+            </a:r>
+            <a:r>
+              <a:rPr lang="en-US" dirty="0"/>
+              <a:t> API in R</a:t>
+            </a:r>
+            <a:endParaRPr lang="en-US"/>
+          </a:p>
+        </p:txBody>
+      </p:sp>
+      <p:sp>
+        <p:nvSpPr>
+          <p:cNvPr id="6" name="Slide Number Placeholder 5">
+            <a:extLst>
+              <a:ext uri="{FF2B5EF4-FFF2-40B4-BE49-F238E27FC236}">
+                <a16:creationId xmlns:a16="http://schemas.microsoft.com/office/drawing/2014/main" id="{67EA06B3-03CB-AFC8-C58D-9D296D8E1646}"/>
               </a:ext>
             </a:extLst>
           </p:cNvPr>
@@ -13615,420 +13919,128 @@
             <p:ph type="sldNum" sz="quarter" idx="4"/>
           </p:nvPr>
         </p:nvSpPr>
-        <p:spPr/>
-        <p:txBody>
-          <a:bodyPr/>
+        <p:spPr>
+          <a:xfrm>
+            <a:off x="10153276" y="6356350"/>
+            <a:ext cx="1657723" cy="365125"/>
+          </a:xfrm>
+        </p:spPr>
+        <p:txBody>
+          <a:bodyPr anchor="ctr">
+            <a:normAutofit/>
+          </a:bodyPr>
           <a:lstStyle/>
           <a:p>
+            <a:pPr>
+              <a:spcAft>
+                <a:spcPts val="600"/>
+              </a:spcAft>
+            </a:pPr>
             <a:fld id="{294A09A9-5501-47C1-A89A-A340965A2BE2}" type="slidenum">
               <a:rPr lang="en-US" smtClean="0"/>
-              <a:pPr/>
+              <a:pPr>
+                <a:spcAft>
+                  <a:spcPts val="600"/>
+                </a:spcAft>
+              </a:pPr>
               <a:t>4</a:t>
             </a:fld>
-            <a:endParaRPr lang="en-US" dirty="0"/>
+            <a:endParaRPr lang="en-US"/>
           </a:p>
         </p:txBody>
       </p:sp>
       <p:pic>
         <p:nvPicPr>
-          <p:cNvPr id="12" name="Picture 11" descr="stack of papers Icon - Free PNG &amp; SVG 342863 - Noun Project">
-            <a:extLst>
-              <a:ext uri="{FF2B5EF4-FFF2-40B4-BE49-F238E27FC236}">
-                <a16:creationId xmlns:a16="http://schemas.microsoft.com/office/drawing/2014/main" id="{25CD8CD3-A757-0ED6-8A05-F407B3EB3455}"/>
+          <p:cNvPr id="13" name="Content Placeholder 12">
+            <a:extLst>
+              <a:ext uri="{FF2B5EF4-FFF2-40B4-BE49-F238E27FC236}">
+                <a16:creationId xmlns:a16="http://schemas.microsoft.com/office/drawing/2014/main" id="{06ED7FF6-E8FD-12AC-EA58-4629E0105C07}"/>
               </a:ext>
             </a:extLst>
           </p:cNvPr>
           <p:cNvPicPr>
-            <a:picLocks noChangeAspect="1" noChangeArrowheads="1"/>
-          </p:cNvPicPr>
-          <p:nvPr/>
-        </p:nvPicPr>
-        <p:blipFill>
-          <a:blip r:embed="rId4">
-            <a:extLst>
-              <a:ext uri="{28A0092B-C50C-407E-A947-70E740481C1C}">
-                <a14:useLocalDpi xmlns:a14="http://schemas.microsoft.com/office/drawing/2010/main" val="0"/>
-              </a:ext>
-            </a:extLst>
-          </a:blip>
-          <a:srcRect/>
-          <a:stretch>
-            <a:fillRect/>
-          </a:stretch>
-        </p:blipFill>
-        <p:spPr bwMode="auto">
-          <a:xfrm>
-            <a:off x="1534297" y="2245757"/>
-            <a:ext cx="1504950" cy="1504950"/>
-          </a:xfrm>
-          <a:prstGeom prst="rect">
-            <a:avLst/>
-          </a:prstGeom>
-          <a:noFill/>
-          <a:extLst>
-            <a:ext uri="{909E8E84-426E-40DD-AFC4-6F175D3DCCD1}">
-              <a14:hiddenFill xmlns:a14="http://schemas.microsoft.com/office/drawing/2010/main">
-                <a:solidFill>
-                  <a:srgbClr val="FFFFFF"/>
-                </a:solidFill>
-              </a14:hiddenFill>
-            </a:ext>
-          </a:extLst>
-        </p:spPr>
-      </p:pic>
-      <p:pic>
-        <p:nvPicPr>
-          <p:cNvPr id="1026" name="Picture 2" descr="Api Icon Vector Art, Icons, and Graphics for Free Download">
-            <a:extLst>
-              <a:ext uri="{FF2B5EF4-FFF2-40B4-BE49-F238E27FC236}">
-                <a16:creationId xmlns:a16="http://schemas.microsoft.com/office/drawing/2014/main" id="{37EF6E23-2D44-5D2B-AE3A-4AEDEE14CE5B}"/>
-              </a:ext>
-            </a:extLst>
-          </p:cNvPr>
-          <p:cNvPicPr>
-            <a:picLocks noGrp="1" noChangeAspect="1" noChangeArrowheads="1"/>
+            <a:picLocks noGrp="1" noChangeAspect="1"/>
           </p:cNvPicPr>
           <p:nvPr>
             <p:ph idx="10"/>
           </p:nvPr>
         </p:nvPicPr>
         <p:blipFill>
-          <a:blip r:embed="rId5">
-            <a:extLst>
-              <a:ext uri="{28A0092B-C50C-407E-A947-70E740481C1C}">
-                <a14:useLocalDpi xmlns:a14="http://schemas.microsoft.com/office/drawing/2010/main" val="0"/>
-              </a:ext>
-            </a:extLst>
-          </a:blip>
-          <a:srcRect/>
+          <a:blip r:embed="rId3"/>
           <a:stretch>
             <a:fillRect/>
           </a:stretch>
         </p:blipFill>
-        <p:spPr bwMode="auto">
-          <a:xfrm>
-            <a:off x="4583898" y="392097"/>
-            <a:ext cx="2173168" cy="1337334"/>
-          </a:xfrm>
-          <a:prstGeom prst="rect">
-            <a:avLst/>
-          </a:prstGeom>
+        <p:spPr>
+          <a:xfrm>
+            <a:off x="1167493" y="2827329"/>
+            <a:ext cx="4663440" cy="1713813"/>
+          </a:xfrm>
           <a:noFill/>
-          <a:extLst>
-            <a:ext uri="{909E8E84-426E-40DD-AFC4-6F175D3DCCD1}">
-              <a14:hiddenFill xmlns:a14="http://schemas.microsoft.com/office/drawing/2010/main">
-                <a:solidFill>
-                  <a:srgbClr val="FFFFFF"/>
-                </a:solidFill>
-              </a14:hiddenFill>
-            </a:ext>
-          </a:extLst>
         </p:spPr>
       </p:pic>
-      <p:pic>
-        <p:nvPicPr>
-          <p:cNvPr id="1030" name="Picture 6" descr="Speech bubble - Free communications icons">
-            <a:extLst>
-              <a:ext uri="{FF2B5EF4-FFF2-40B4-BE49-F238E27FC236}">
-                <a16:creationId xmlns:a16="http://schemas.microsoft.com/office/drawing/2014/main" id="{E91C1B26-AD6A-1C8E-AB1D-3C5F4C486F25}"/>
-              </a:ext>
-            </a:extLst>
-          </p:cNvPr>
-          <p:cNvPicPr>
-            <a:picLocks noChangeAspect="1" noChangeArrowheads="1"/>
-          </p:cNvPicPr>
-          <p:nvPr/>
-        </p:nvPicPr>
-        <p:blipFill>
-          <a:blip r:embed="rId6">
-            <a:extLst>
-              <a:ext uri="{28A0092B-C50C-407E-A947-70E740481C1C}">
-                <a14:useLocalDpi xmlns:a14="http://schemas.microsoft.com/office/drawing/2010/main" val="0"/>
-              </a:ext>
-            </a:extLst>
-          </a:blip>
-          <a:srcRect/>
-          <a:stretch>
-            <a:fillRect/>
-          </a:stretch>
-        </p:blipFill>
-        <p:spPr bwMode="auto">
-          <a:xfrm>
-            <a:off x="1744572" y="3775436"/>
-            <a:ext cx="1210310" cy="1210308"/>
-          </a:xfrm>
-          <a:prstGeom prst="rect">
-            <a:avLst/>
-          </a:prstGeom>
-          <a:noFill/>
-          <a:extLst>
-            <a:ext uri="{909E8E84-426E-40DD-AFC4-6F175D3DCCD1}">
-              <a14:hiddenFill xmlns:a14="http://schemas.microsoft.com/office/drawing/2010/main">
-                <a:solidFill>
-                  <a:srgbClr val="FFFFFF"/>
-                </a:solidFill>
-              </a14:hiddenFill>
-            </a:ext>
-          </a:extLst>
-        </p:spPr>
-      </p:pic>
-      <p:cxnSp>
-        <p:nvCxnSpPr>
-          <p:cNvPr id="22" name="Straight Arrow Connector 21">
-            <a:extLst>
-              <a:ext uri="{FF2B5EF4-FFF2-40B4-BE49-F238E27FC236}">
-                <a16:creationId xmlns:a16="http://schemas.microsoft.com/office/drawing/2014/main" id="{0C15A8EA-5185-9B1F-E711-9125F684FF30}"/>
-              </a:ext>
-            </a:extLst>
-          </p:cNvPr>
-          <p:cNvCxnSpPr>
-            <a:stCxn id="12" idx="3"/>
-          </p:cNvCxnSpPr>
-          <p:nvPr/>
-        </p:nvCxnSpPr>
-        <p:spPr>
-          <a:xfrm>
-            <a:off x="3039247" y="2998232"/>
-            <a:ext cx="476113" cy="532368"/>
-          </a:xfrm>
-          <a:prstGeom prst="straightConnector1">
-            <a:avLst/>
-          </a:prstGeom>
-          <a:ln w="28575">
-            <a:tailEnd type="triangle"/>
-          </a:ln>
-        </p:spPr>
-        <p:style>
-          <a:lnRef idx="1">
-            <a:schemeClr val="accent1"/>
-          </a:lnRef>
-          <a:fillRef idx="0">
-            <a:schemeClr val="accent1"/>
-          </a:fillRef>
-          <a:effectRef idx="0">
-            <a:schemeClr val="accent1"/>
-          </a:effectRef>
-          <a:fontRef idx="minor">
-            <a:schemeClr val="tx1"/>
-          </a:fontRef>
-        </p:style>
-      </p:cxnSp>
-      <p:cxnSp>
-        <p:nvCxnSpPr>
-          <p:cNvPr id="24" name="Straight Arrow Connector 23">
-            <a:extLst>
-              <a:ext uri="{FF2B5EF4-FFF2-40B4-BE49-F238E27FC236}">
-                <a16:creationId xmlns:a16="http://schemas.microsoft.com/office/drawing/2014/main" id="{EB94EE1D-E322-0CDC-2713-F7A681F31AB6}"/>
-              </a:ext>
-            </a:extLst>
-          </p:cNvPr>
-          <p:cNvCxnSpPr/>
-          <p:nvPr/>
-        </p:nvCxnSpPr>
-        <p:spPr>
-          <a:xfrm flipV="1">
-            <a:off x="3119120" y="3667760"/>
-            <a:ext cx="396240" cy="701040"/>
-          </a:xfrm>
-          <a:prstGeom prst="straightConnector1">
-            <a:avLst/>
-          </a:prstGeom>
-          <a:ln w="28575">
-            <a:tailEnd type="triangle"/>
-          </a:ln>
-        </p:spPr>
-        <p:style>
-          <a:lnRef idx="1">
-            <a:schemeClr val="accent1"/>
-          </a:lnRef>
-          <a:fillRef idx="0">
-            <a:schemeClr val="accent1"/>
-          </a:fillRef>
-          <a:effectRef idx="0">
-            <a:schemeClr val="accent1"/>
-          </a:effectRef>
-          <a:fontRef idx="minor">
-            <a:schemeClr val="tx1"/>
-          </a:fontRef>
-        </p:style>
-      </p:cxnSp>
-      <p:cxnSp>
-        <p:nvCxnSpPr>
-          <p:cNvPr id="26" name="Straight Arrow Connector 25">
-            <a:extLst>
-              <a:ext uri="{FF2B5EF4-FFF2-40B4-BE49-F238E27FC236}">
-                <a16:creationId xmlns:a16="http://schemas.microsoft.com/office/drawing/2014/main" id="{5A87B0B5-DF29-0FCC-A6B8-0D9F7B16AA0D}"/>
-              </a:ext>
-            </a:extLst>
-          </p:cNvPr>
-          <p:cNvCxnSpPr>
-            <a:cxnSpLocks/>
-          </p:cNvCxnSpPr>
-          <p:nvPr/>
-        </p:nvCxnSpPr>
-        <p:spPr>
-          <a:xfrm>
-            <a:off x="3667760" y="3530600"/>
-            <a:ext cx="741680" cy="0"/>
-          </a:xfrm>
-          <a:prstGeom prst="straightConnector1">
-            <a:avLst/>
-          </a:prstGeom>
-          <a:ln w="28575">
-            <a:tailEnd type="triangle"/>
-          </a:ln>
-        </p:spPr>
-        <p:style>
-          <a:lnRef idx="1">
-            <a:schemeClr val="accent1"/>
-          </a:lnRef>
-          <a:fillRef idx="0">
-            <a:schemeClr val="accent1"/>
-          </a:fillRef>
-          <a:effectRef idx="0">
-            <a:schemeClr val="accent1"/>
-          </a:effectRef>
-          <a:fontRef idx="minor">
-            <a:schemeClr val="tx1"/>
-          </a:fontRef>
-        </p:style>
-      </p:cxnSp>
-      <p:cxnSp>
-        <p:nvCxnSpPr>
-          <p:cNvPr id="30" name="Straight Arrow Connector 29">
-            <a:extLst>
-              <a:ext uri="{FF2B5EF4-FFF2-40B4-BE49-F238E27FC236}">
-                <a16:creationId xmlns:a16="http://schemas.microsoft.com/office/drawing/2014/main" id="{55842FD6-99A8-2E8D-8952-B64337F498F2}"/>
-              </a:ext>
-            </a:extLst>
-          </p:cNvPr>
-          <p:cNvCxnSpPr/>
-          <p:nvPr/>
-        </p:nvCxnSpPr>
-        <p:spPr>
-          <a:xfrm>
-            <a:off x="6929120" y="3566160"/>
-            <a:ext cx="1224280" cy="0"/>
-          </a:xfrm>
-          <a:prstGeom prst="straightConnector1">
-            <a:avLst/>
-          </a:prstGeom>
-          <a:ln w="28575">
-            <a:tailEnd type="triangle"/>
-          </a:ln>
-        </p:spPr>
-        <p:style>
-          <a:lnRef idx="1">
-            <a:schemeClr val="accent1"/>
-          </a:lnRef>
-          <a:fillRef idx="0">
-            <a:schemeClr val="accent1"/>
-          </a:fillRef>
-          <a:effectRef idx="0">
-            <a:schemeClr val="accent1"/>
-          </a:effectRef>
-          <a:fontRef idx="minor">
-            <a:schemeClr val="tx1"/>
-          </a:fontRef>
-        </p:style>
-      </p:cxnSp>
-      <p:cxnSp>
-        <p:nvCxnSpPr>
-          <p:cNvPr id="35" name="Straight Arrow Connector 34">
-            <a:extLst>
-              <a:ext uri="{FF2B5EF4-FFF2-40B4-BE49-F238E27FC236}">
-                <a16:creationId xmlns:a16="http://schemas.microsoft.com/office/drawing/2014/main" id="{33B6115E-6479-DE74-D605-5665E69BC7F0}"/>
-              </a:ext>
-            </a:extLst>
-          </p:cNvPr>
-          <p:cNvCxnSpPr/>
-          <p:nvPr/>
-        </p:nvCxnSpPr>
-        <p:spPr>
-          <a:xfrm>
-            <a:off x="5669280" y="2032000"/>
-            <a:ext cx="0" cy="864632"/>
-          </a:xfrm>
-          <a:prstGeom prst="straightConnector1">
-            <a:avLst/>
-          </a:prstGeom>
-          <a:ln w="28575">
-            <a:headEnd type="triangle"/>
-            <a:tailEnd type="triangle"/>
-          </a:ln>
-        </p:spPr>
-        <p:style>
-          <a:lnRef idx="1">
-            <a:schemeClr val="accent1"/>
-          </a:lnRef>
-          <a:fillRef idx="0">
-            <a:schemeClr val="accent1"/>
-          </a:fillRef>
-          <a:effectRef idx="0">
-            <a:schemeClr val="accent1"/>
-          </a:effectRef>
-          <a:fontRef idx="minor">
-            <a:schemeClr val="tx1"/>
-          </a:fontRef>
-        </p:style>
-      </p:cxnSp>
-      <p:sp>
-        <p:nvSpPr>
-          <p:cNvPr id="37" name="Rectangle: Rounded Corners 36">
-            <a:extLst>
-              <a:ext uri="{FF2B5EF4-FFF2-40B4-BE49-F238E27FC236}">
-                <a16:creationId xmlns:a16="http://schemas.microsoft.com/office/drawing/2014/main" id="{D1FD724F-7BDC-E8C7-CD15-AB9026C2BE1B}"/>
-              </a:ext>
-            </a:extLst>
-          </p:cNvPr>
-          <p:cNvSpPr/>
-          <p:nvPr/>
-        </p:nvSpPr>
-        <p:spPr>
-          <a:xfrm>
-            <a:off x="4653700" y="3091659"/>
-            <a:ext cx="1973184" cy="949002"/>
-          </a:xfrm>
-          <a:prstGeom prst="roundRect">
-            <a:avLst/>
-          </a:prstGeom>
-          <a:solidFill>
-            <a:schemeClr val="bg1"/>
-          </a:solidFill>
-          <a:ln w="38100">
-            <a:solidFill>
-              <a:schemeClr val="tx1"/>
-            </a:solidFill>
-          </a:ln>
-        </p:spPr>
-        <p:style>
-          <a:lnRef idx="2">
-            <a:schemeClr val="accent1">
-              <a:shade val="50000"/>
-            </a:schemeClr>
-          </a:lnRef>
-          <a:fillRef idx="1">
-            <a:schemeClr val="accent1"/>
-          </a:fillRef>
-          <a:effectRef idx="0">
-            <a:schemeClr val="accent1"/>
-          </a:effectRef>
-          <a:fontRef idx="minor">
-            <a:schemeClr val="lt1"/>
-          </a:fontRef>
-        </p:style>
-        <p:txBody>
-          <a:bodyPr rtlCol="0" anchor="ctr"/>
+      <p:sp>
+        <p:nvSpPr>
+          <p:cNvPr id="18" name="Content Placeholder 7">
+            <a:extLst>
+              <a:ext uri="{FF2B5EF4-FFF2-40B4-BE49-F238E27FC236}">
+                <a16:creationId xmlns:a16="http://schemas.microsoft.com/office/drawing/2014/main" id="{12DF2BFA-49FA-8914-0FCC-9F8D633CEDFC}"/>
+              </a:ext>
+            </a:extLst>
+          </p:cNvPr>
+          <p:cNvSpPr>
+            <a:spLocks noGrp="1"/>
+          </p:cNvSpPr>
+          <p:nvPr>
+            <p:ph idx="11"/>
+          </p:nvPr>
+        </p:nvSpPr>
+        <p:spPr>
+          <a:xfrm>
+            <a:off x="1167493" y="2005689"/>
+            <a:ext cx="4663440" cy="522514"/>
+          </a:xfrm>
+        </p:spPr>
+        <p:txBody>
+          <a:bodyPr/>
           <a:lstStyle/>
           <a:p>
-            <a:pPr algn="ctr"/>
-            <a:r>
-              <a:rPr lang="en-US" b="1" dirty="0">
-                <a:solidFill>
-                  <a:schemeClr val="tx1"/>
-                </a:solidFill>
-              </a:rPr>
-              <a:t>R Code</a:t>
+            <a:r>
+              <a:rPr lang="en-US" dirty="0"/>
+              <a:t>Sample Input Text</a:t>
+            </a:r>
+          </a:p>
+        </p:txBody>
+      </p:sp>
+      <p:sp>
+        <p:nvSpPr>
+          <p:cNvPr id="20" name="Content Placeholder 8">
+            <a:extLst>
+              <a:ext uri="{FF2B5EF4-FFF2-40B4-BE49-F238E27FC236}">
+                <a16:creationId xmlns:a16="http://schemas.microsoft.com/office/drawing/2014/main" id="{9A28403A-28E6-70A5-F24D-76B1928B7838}"/>
+              </a:ext>
+            </a:extLst>
+          </p:cNvPr>
+          <p:cNvSpPr>
+            <a:spLocks noGrp="1"/>
+          </p:cNvSpPr>
+          <p:nvPr>
+            <p:ph idx="12"/>
+          </p:nvPr>
+        </p:nvSpPr>
+        <p:spPr>
+          <a:xfrm>
+            <a:off x="6283235" y="2005689"/>
+            <a:ext cx="4663440" cy="522514"/>
+          </a:xfrm>
+        </p:spPr>
+        <p:txBody>
+          <a:bodyPr/>
+          <a:lstStyle/>
+          <a:p>
+            <a:r>
+              <a:rPr lang="en-US" dirty="0"/>
+              <a:t>Resume Excerpt</a:t>
             </a:r>
           </a:p>
         </p:txBody>
@@ -14036,7 +14048,7 @@
     </p:spTree>
     <p:extLst>
       <p:ext uri="{BB962C8B-B14F-4D97-AF65-F5344CB8AC3E}">
-        <p14:creationId xmlns:p14="http://schemas.microsoft.com/office/powerpoint/2010/main" val="2478564143"/>
+        <p14:creationId xmlns:p14="http://schemas.microsoft.com/office/powerpoint/2010/main" val="409617130"/>
       </p:ext>
     </p:extLst>
   </p:cSld>
@@ -14065,280 +14077,10 @@
       </p:grpSpPr>
       <p:sp>
         <p:nvSpPr>
-          <p:cNvPr id="2" name="Title 1">
-            <a:extLst>
-              <a:ext uri="{FF2B5EF4-FFF2-40B4-BE49-F238E27FC236}">
-                <a16:creationId xmlns:a16="http://schemas.microsoft.com/office/drawing/2014/main" id="{E5F191A4-7839-4F63-B17C-7C366C59488C}"/>
-              </a:ext>
-            </a:extLst>
-          </p:cNvPr>
-          <p:cNvSpPr>
-            <a:spLocks noGrp="1"/>
-          </p:cNvSpPr>
-          <p:nvPr>
-            <p:ph type="title"/>
-          </p:nvPr>
-        </p:nvSpPr>
-        <p:spPr>
-          <a:xfrm>
-            <a:off x="1167492" y="381000"/>
-            <a:ext cx="9779183" cy="1325563"/>
-          </a:xfrm>
-        </p:spPr>
-        <p:txBody>
-          <a:bodyPr/>
-          <a:lstStyle/>
-          <a:p>
-            <a:r>
-              <a:rPr lang="en-US" dirty="0"/>
-              <a:t>Process</a:t>
-            </a:r>
-          </a:p>
-        </p:txBody>
-      </p:sp>
-      <p:sp>
-        <p:nvSpPr>
-          <p:cNvPr id="9" name="Content Placeholder 8">
-            <a:extLst>
-              <a:ext uri="{FF2B5EF4-FFF2-40B4-BE49-F238E27FC236}">
-                <a16:creationId xmlns:a16="http://schemas.microsoft.com/office/drawing/2014/main" id="{472FA7B1-CD7F-3646-B44C-91A107A0CBEE}"/>
-              </a:ext>
-            </a:extLst>
-          </p:cNvPr>
-          <p:cNvSpPr>
-            <a:spLocks noGrp="1"/>
-          </p:cNvSpPr>
-          <p:nvPr>
-            <p:ph idx="11"/>
-          </p:nvPr>
-        </p:nvSpPr>
-        <p:spPr>
-          <a:xfrm>
-            <a:off x="1167493" y="2003804"/>
-            <a:ext cx="3173278" cy="522514"/>
-          </a:xfrm>
-        </p:spPr>
-        <p:txBody>
-          <a:bodyPr/>
-          <a:lstStyle/>
-          <a:p>
-            <a:r>
-              <a:rPr lang="en-US" dirty="0"/>
-              <a:t>Read in your text</a:t>
-            </a:r>
-          </a:p>
-        </p:txBody>
-      </p:sp>
-      <p:sp>
-        <p:nvSpPr>
-          <p:cNvPr id="4" name="Content Placeholder 3">
-            <a:extLst>
-              <a:ext uri="{FF2B5EF4-FFF2-40B4-BE49-F238E27FC236}">
-                <a16:creationId xmlns:a16="http://schemas.microsoft.com/office/drawing/2014/main" id="{9B9ED227-95A7-4B08-91FE-5E0EF0D41D20}"/>
-              </a:ext>
-            </a:extLst>
-          </p:cNvPr>
-          <p:cNvSpPr>
-            <a:spLocks noGrp="1"/>
-          </p:cNvSpPr>
-          <p:nvPr>
-            <p:ph idx="1"/>
-          </p:nvPr>
-        </p:nvSpPr>
-        <p:spPr>
-          <a:xfrm>
-            <a:off x="1167491" y="2526318"/>
-            <a:ext cx="3218688" cy="2828613"/>
-          </a:xfrm>
-        </p:spPr>
-        <p:txBody>
-          <a:bodyPr vert="horz" lIns="91440" tIns="45720" rIns="91440" bIns="45720" rtlCol="0" anchor="t">
-            <a:noAutofit/>
-          </a:bodyPr>
-          <a:lstStyle/>
-          <a:p>
-            <a:r>
-              <a:rPr lang="en-US" dirty="0"/>
-              <a:t>Get your text from your .csv file, API, etc.</a:t>
-            </a:r>
-          </a:p>
-          <a:p>
-            <a:r>
-              <a:rPr lang="en-US" dirty="0"/>
-              <a:t>Concatenate it with your prompt</a:t>
-            </a:r>
-          </a:p>
-        </p:txBody>
-      </p:sp>
-      <p:sp>
-        <p:nvSpPr>
-          <p:cNvPr id="10" name="Content Placeholder 9">
-            <a:extLst>
-              <a:ext uri="{FF2B5EF4-FFF2-40B4-BE49-F238E27FC236}">
-                <a16:creationId xmlns:a16="http://schemas.microsoft.com/office/drawing/2014/main" id="{585697B7-EBBB-0E4B-AA02-0D3F94821C6E}"/>
-              </a:ext>
-            </a:extLst>
-          </p:cNvPr>
-          <p:cNvSpPr>
-            <a:spLocks noGrp="1"/>
-          </p:cNvSpPr>
-          <p:nvPr>
-            <p:ph idx="12"/>
-          </p:nvPr>
-        </p:nvSpPr>
-        <p:spPr>
-          <a:xfrm>
-            <a:off x="4683788" y="2003804"/>
-            <a:ext cx="3173278" cy="522514"/>
-          </a:xfrm>
-        </p:spPr>
-        <p:txBody>
-          <a:bodyPr/>
-          <a:lstStyle/>
-          <a:p>
-            <a:r>
-              <a:rPr lang="en-US" dirty="0"/>
-              <a:t>Use With </a:t>
-            </a:r>
-            <a:r>
-              <a:rPr lang="en-US" dirty="0" err="1"/>
-              <a:t>ChatGPT</a:t>
-            </a:r>
-            <a:r>
-              <a:rPr lang="en-US" dirty="0"/>
-              <a:t> API</a:t>
-            </a:r>
-          </a:p>
-        </p:txBody>
-      </p:sp>
-      <p:sp>
-        <p:nvSpPr>
-          <p:cNvPr id="5" name="Content Placeholder 4">
-            <a:extLst>
-              <a:ext uri="{FF2B5EF4-FFF2-40B4-BE49-F238E27FC236}">
-                <a16:creationId xmlns:a16="http://schemas.microsoft.com/office/drawing/2014/main" id="{9C2ECAAA-1E9C-4845-8EA9-E11A76F08150}"/>
-              </a:ext>
-            </a:extLst>
-          </p:cNvPr>
-          <p:cNvSpPr>
-            <a:spLocks noGrp="1"/>
-          </p:cNvSpPr>
-          <p:nvPr>
-            <p:ph idx="10"/>
-          </p:nvPr>
-        </p:nvSpPr>
-        <p:spPr>
-          <a:xfrm>
-            <a:off x="4683787" y="2526318"/>
-            <a:ext cx="3173279" cy="2828613"/>
-          </a:xfrm>
-        </p:spPr>
-        <p:txBody>
-          <a:bodyPr vert="horz" lIns="91440" tIns="45720" rIns="91440" bIns="45720" rtlCol="0" anchor="t">
-            <a:normAutofit/>
-          </a:bodyPr>
-          <a:lstStyle/>
-          <a:p>
-            <a:r>
-              <a:rPr lang="en-US" dirty="0"/>
-              <a:t>Sending a block of text</a:t>
-            </a:r>
-          </a:p>
-          <a:p>
-            <a:r>
-              <a:rPr lang="en-US" dirty="0"/>
-              <a:t>Getting back a result</a:t>
-            </a:r>
-          </a:p>
-          <a:p>
-            <a:r>
-              <a:rPr lang="en-US" dirty="0"/>
-              <a:t>Putting in a table/data frame</a:t>
-            </a:r>
-          </a:p>
-          <a:p>
-            <a:endParaRPr lang="en-US" dirty="0"/>
-          </a:p>
-        </p:txBody>
-      </p:sp>
-      <p:sp>
-        <p:nvSpPr>
-          <p:cNvPr id="13" name="Content Placeholder 12">
-            <a:extLst>
-              <a:ext uri="{FF2B5EF4-FFF2-40B4-BE49-F238E27FC236}">
-                <a16:creationId xmlns:a16="http://schemas.microsoft.com/office/drawing/2014/main" id="{EB1FFBC5-1733-5E4A-BF11-2C157D9917CC}"/>
-              </a:ext>
-            </a:extLst>
-          </p:cNvPr>
-          <p:cNvSpPr>
-            <a:spLocks noGrp="1"/>
-          </p:cNvSpPr>
-          <p:nvPr>
-            <p:ph idx="14"/>
-          </p:nvPr>
-        </p:nvSpPr>
-        <p:spPr>
-          <a:xfrm>
-            <a:off x="8200082" y="2003804"/>
-            <a:ext cx="3839518" cy="522514"/>
-          </a:xfrm>
-        </p:spPr>
-        <p:txBody>
-          <a:bodyPr/>
-          <a:lstStyle/>
-          <a:p>
-            <a:r>
-              <a:rPr lang="en-US" dirty="0"/>
-              <a:t>Evaluate the Results</a:t>
-            </a:r>
-          </a:p>
-        </p:txBody>
-      </p:sp>
-      <p:sp>
-        <p:nvSpPr>
-          <p:cNvPr id="11" name="Content Placeholder 10">
-            <a:extLst>
-              <a:ext uri="{FF2B5EF4-FFF2-40B4-BE49-F238E27FC236}">
-                <a16:creationId xmlns:a16="http://schemas.microsoft.com/office/drawing/2014/main" id="{48A12450-9474-8A49-BAEB-20C6F51540D5}"/>
-              </a:ext>
-            </a:extLst>
-          </p:cNvPr>
-          <p:cNvSpPr>
-            <a:spLocks noGrp="1"/>
-          </p:cNvSpPr>
-          <p:nvPr>
-            <p:ph idx="13"/>
-          </p:nvPr>
-        </p:nvSpPr>
-        <p:spPr>
-          <a:xfrm>
-            <a:off x="8200082" y="2526318"/>
-            <a:ext cx="3173279" cy="2828613"/>
-          </a:xfrm>
-        </p:spPr>
-        <p:txBody>
-          <a:bodyPr/>
-          <a:lstStyle/>
-          <a:p>
-            <a:r>
-              <a:rPr lang="en-US" dirty="0"/>
-              <a:t>Informally: does it look like you want?</a:t>
-            </a:r>
-          </a:p>
-          <a:p>
-            <a:r>
-              <a:rPr lang="en-US" dirty="0"/>
-              <a:t>Formally: via comparing with your ‘labeled’ data and using metrics like a confusion matrix</a:t>
-            </a:r>
-          </a:p>
-        </p:txBody>
-      </p:sp>
-      <p:sp>
-        <p:nvSpPr>
-          <p:cNvPr id="3" name="Date Placeholder 2">
-            <a:extLst>
-              <a:ext uri="{FF2B5EF4-FFF2-40B4-BE49-F238E27FC236}">
-                <a16:creationId xmlns:a16="http://schemas.microsoft.com/office/drawing/2014/main" id="{75202033-17DD-3E4F-BB90-ADC6A1F0C66F}"/>
+          <p:cNvPr id="4" name="Date Placeholder 3">
+            <a:extLst>
+              <a:ext uri="{FF2B5EF4-FFF2-40B4-BE49-F238E27FC236}">
+                <a16:creationId xmlns:a16="http://schemas.microsoft.com/office/drawing/2014/main" id="{3E56AFBE-E0BD-BBC7-92EB-CB17B52AF306}"/>
               </a:ext>
             </a:extLst>
           </p:cNvPr>
@@ -14349,12 +14091,7 @@
             <p:ph type="dt" sz="half" idx="2"/>
           </p:nvPr>
         </p:nvSpPr>
-        <p:spPr>
-          <a:xfrm>
-            <a:off x="381000" y="6356350"/>
-            <a:ext cx="1767114" cy="365125"/>
-          </a:xfrm>
-        </p:spPr>
+        <p:spPr/>
         <p:txBody>
           <a:bodyPr/>
           <a:lstStyle/>
@@ -14368,10 +14105,10 @@
       </p:sp>
       <p:sp>
         <p:nvSpPr>
-          <p:cNvPr id="7" name="Footer Placeholder 6">
-            <a:extLst>
-              <a:ext uri="{FF2B5EF4-FFF2-40B4-BE49-F238E27FC236}">
-                <a16:creationId xmlns:a16="http://schemas.microsoft.com/office/drawing/2014/main" id="{B42ACFC2-B54A-8244-B5D9-4B1EC2EED59D}"/>
+          <p:cNvPr id="5" name="Footer Placeholder 4">
+            <a:extLst>
+              <a:ext uri="{FF2B5EF4-FFF2-40B4-BE49-F238E27FC236}">
+                <a16:creationId xmlns:a16="http://schemas.microsoft.com/office/drawing/2014/main" id="{BD490393-017C-6D1E-8D75-8B9883A498D1}"/>
               </a:ext>
             </a:extLst>
           </p:cNvPr>
@@ -14382,12 +14119,7 @@
             <p:ph type="ftr" sz="quarter" idx="3"/>
           </p:nvPr>
         </p:nvSpPr>
-        <p:spPr>
-          <a:xfrm>
-            <a:off x="4038600" y="6356350"/>
-            <a:ext cx="4114800" cy="365125"/>
-          </a:xfrm>
-        </p:spPr>
+        <p:spPr/>
         <p:txBody>
           <a:bodyPr/>
           <a:lstStyle/>
@@ -14407,12 +14139,47 @@
           </a:p>
         </p:txBody>
       </p:sp>
-      <p:sp>
-        <p:nvSpPr>
-          <p:cNvPr id="8" name="Slide Number Placeholder 7">
-            <a:extLst>
-              <a:ext uri="{FF2B5EF4-FFF2-40B4-BE49-F238E27FC236}">
-                <a16:creationId xmlns:a16="http://schemas.microsoft.com/office/drawing/2014/main" id="{B609FC03-B5BE-D846-993A-8E351C9509F3}"/>
+      <p:pic>
+        <p:nvPicPr>
+          <p:cNvPr id="14" name="Content Placeholder 13" descr="Table outline">
+            <a:extLst>
+              <a:ext uri="{FF2B5EF4-FFF2-40B4-BE49-F238E27FC236}">
+                <a16:creationId xmlns:a16="http://schemas.microsoft.com/office/drawing/2014/main" id="{58F3B669-3989-B0A6-B19A-731580FBC919}"/>
+              </a:ext>
+            </a:extLst>
+          </p:cNvPr>
+          <p:cNvPicPr>
+            <a:picLocks noGrp="1" noChangeAspect="1"/>
+          </p:cNvPicPr>
+          <p:nvPr>
+            <p:ph idx="13"/>
+          </p:nvPr>
+        </p:nvPicPr>
+        <p:blipFill>
+          <a:blip r:embed="rId2">
+            <a:extLst>
+              <a:ext uri="{96DAC541-7B7A-43D3-8B79-37D633B846F1}">
+                <asvg:svgBlip xmlns:asvg="http://schemas.microsoft.com/office/drawing/2016/SVG/main" r:embed="rId3"/>
+              </a:ext>
+            </a:extLst>
+          </a:blip>
+          <a:stretch>
+            <a:fillRect/>
+          </a:stretch>
+        </p:blipFill>
+        <p:spPr>
+          <a:xfrm>
+            <a:off x="8397660" y="2652792"/>
+            <a:ext cx="1755616" cy="1755616"/>
+          </a:xfrm>
+        </p:spPr>
+      </p:pic>
+      <p:sp>
+        <p:nvSpPr>
+          <p:cNvPr id="11" name="Slide Number Placeholder 10">
+            <a:extLst>
+              <a:ext uri="{FF2B5EF4-FFF2-40B4-BE49-F238E27FC236}">
+                <a16:creationId xmlns:a16="http://schemas.microsoft.com/office/drawing/2014/main" id="{F07D5E45-46E9-2D84-CEFF-330AB2A2B0A0}"/>
               </a:ext>
             </a:extLst>
           </p:cNvPr>
@@ -14423,12 +14190,7 @@
             <p:ph type="sldNum" sz="quarter" idx="4"/>
           </p:nvPr>
         </p:nvSpPr>
-        <p:spPr>
-          <a:xfrm>
-            <a:off x="10153276" y="6356350"/>
-            <a:ext cx="1657723" cy="365125"/>
-          </a:xfrm>
-        </p:spPr>
+        <p:spPr/>
         <p:txBody>
           <a:bodyPr/>
           <a:lstStyle/>
@@ -14442,10 +14204,414 @@
           </a:p>
         </p:txBody>
       </p:sp>
+      <p:pic>
+        <p:nvPicPr>
+          <p:cNvPr id="12" name="Picture 11" descr="stack of papers Icon - Free PNG &amp; SVG 342863 - Noun Project">
+            <a:extLst>
+              <a:ext uri="{FF2B5EF4-FFF2-40B4-BE49-F238E27FC236}">
+                <a16:creationId xmlns:a16="http://schemas.microsoft.com/office/drawing/2014/main" id="{25CD8CD3-A757-0ED6-8A05-F407B3EB3455}"/>
+              </a:ext>
+            </a:extLst>
+          </p:cNvPr>
+          <p:cNvPicPr>
+            <a:picLocks noChangeAspect="1" noChangeArrowheads="1"/>
+          </p:cNvPicPr>
+          <p:nvPr/>
+        </p:nvPicPr>
+        <p:blipFill>
+          <a:blip r:embed="rId4">
+            <a:extLst>
+              <a:ext uri="{28A0092B-C50C-407E-A947-70E740481C1C}">
+                <a14:useLocalDpi xmlns:a14="http://schemas.microsoft.com/office/drawing/2010/main" val="0"/>
+              </a:ext>
+            </a:extLst>
+          </a:blip>
+          <a:srcRect/>
+          <a:stretch>
+            <a:fillRect/>
+          </a:stretch>
+        </p:blipFill>
+        <p:spPr bwMode="auto">
+          <a:xfrm>
+            <a:off x="1534297" y="2245757"/>
+            <a:ext cx="1504950" cy="1504950"/>
+          </a:xfrm>
+          <a:prstGeom prst="rect">
+            <a:avLst/>
+          </a:prstGeom>
+          <a:noFill/>
+          <a:extLst>
+            <a:ext uri="{909E8E84-426E-40DD-AFC4-6F175D3DCCD1}">
+              <a14:hiddenFill xmlns:a14="http://schemas.microsoft.com/office/drawing/2010/main">
+                <a:solidFill>
+                  <a:srgbClr val="FFFFFF"/>
+                </a:solidFill>
+              </a14:hiddenFill>
+            </a:ext>
+          </a:extLst>
+        </p:spPr>
+      </p:pic>
+      <p:pic>
+        <p:nvPicPr>
+          <p:cNvPr id="1026" name="Picture 2" descr="Api Icon Vector Art, Icons, and Graphics for Free Download">
+            <a:extLst>
+              <a:ext uri="{FF2B5EF4-FFF2-40B4-BE49-F238E27FC236}">
+                <a16:creationId xmlns:a16="http://schemas.microsoft.com/office/drawing/2014/main" id="{37EF6E23-2D44-5D2B-AE3A-4AEDEE14CE5B}"/>
+              </a:ext>
+            </a:extLst>
+          </p:cNvPr>
+          <p:cNvPicPr>
+            <a:picLocks noGrp="1" noChangeAspect="1" noChangeArrowheads="1"/>
+          </p:cNvPicPr>
+          <p:nvPr>
+            <p:ph idx="10"/>
+          </p:nvPr>
+        </p:nvPicPr>
+        <p:blipFill>
+          <a:blip r:embed="rId5">
+            <a:extLst>
+              <a:ext uri="{28A0092B-C50C-407E-A947-70E740481C1C}">
+                <a14:useLocalDpi xmlns:a14="http://schemas.microsoft.com/office/drawing/2010/main" val="0"/>
+              </a:ext>
+            </a:extLst>
+          </a:blip>
+          <a:srcRect/>
+          <a:stretch>
+            <a:fillRect/>
+          </a:stretch>
+        </p:blipFill>
+        <p:spPr bwMode="auto">
+          <a:xfrm>
+            <a:off x="4583898" y="392097"/>
+            <a:ext cx="2173168" cy="1337334"/>
+          </a:xfrm>
+          <a:prstGeom prst="rect">
+            <a:avLst/>
+          </a:prstGeom>
+          <a:noFill/>
+          <a:extLst>
+            <a:ext uri="{909E8E84-426E-40DD-AFC4-6F175D3DCCD1}">
+              <a14:hiddenFill xmlns:a14="http://schemas.microsoft.com/office/drawing/2010/main">
+                <a:solidFill>
+                  <a:srgbClr val="FFFFFF"/>
+                </a:solidFill>
+              </a14:hiddenFill>
+            </a:ext>
+          </a:extLst>
+        </p:spPr>
+      </p:pic>
+      <p:pic>
+        <p:nvPicPr>
+          <p:cNvPr id="1030" name="Picture 6" descr="Speech bubble - Free communications icons">
+            <a:extLst>
+              <a:ext uri="{FF2B5EF4-FFF2-40B4-BE49-F238E27FC236}">
+                <a16:creationId xmlns:a16="http://schemas.microsoft.com/office/drawing/2014/main" id="{E91C1B26-AD6A-1C8E-AB1D-3C5F4C486F25}"/>
+              </a:ext>
+            </a:extLst>
+          </p:cNvPr>
+          <p:cNvPicPr>
+            <a:picLocks noChangeAspect="1" noChangeArrowheads="1"/>
+          </p:cNvPicPr>
+          <p:nvPr/>
+        </p:nvPicPr>
+        <p:blipFill>
+          <a:blip r:embed="rId6">
+            <a:extLst>
+              <a:ext uri="{28A0092B-C50C-407E-A947-70E740481C1C}">
+                <a14:useLocalDpi xmlns:a14="http://schemas.microsoft.com/office/drawing/2010/main" val="0"/>
+              </a:ext>
+            </a:extLst>
+          </a:blip>
+          <a:srcRect/>
+          <a:stretch>
+            <a:fillRect/>
+          </a:stretch>
+        </p:blipFill>
+        <p:spPr bwMode="auto">
+          <a:xfrm>
+            <a:off x="1744572" y="3775436"/>
+            <a:ext cx="1210310" cy="1210308"/>
+          </a:xfrm>
+          <a:prstGeom prst="rect">
+            <a:avLst/>
+          </a:prstGeom>
+          <a:noFill/>
+          <a:extLst>
+            <a:ext uri="{909E8E84-426E-40DD-AFC4-6F175D3DCCD1}">
+              <a14:hiddenFill xmlns:a14="http://schemas.microsoft.com/office/drawing/2010/main">
+                <a:solidFill>
+                  <a:srgbClr val="FFFFFF"/>
+                </a:solidFill>
+              </a14:hiddenFill>
+            </a:ext>
+          </a:extLst>
+        </p:spPr>
+      </p:pic>
+      <p:cxnSp>
+        <p:nvCxnSpPr>
+          <p:cNvPr id="22" name="Straight Arrow Connector 21">
+            <a:extLst>
+              <a:ext uri="{FF2B5EF4-FFF2-40B4-BE49-F238E27FC236}">
+                <a16:creationId xmlns:a16="http://schemas.microsoft.com/office/drawing/2014/main" id="{0C15A8EA-5185-9B1F-E711-9125F684FF30}"/>
+              </a:ext>
+            </a:extLst>
+          </p:cNvPr>
+          <p:cNvCxnSpPr>
+            <a:stCxn id="12" idx="3"/>
+          </p:cNvCxnSpPr>
+          <p:nvPr/>
+        </p:nvCxnSpPr>
+        <p:spPr>
+          <a:xfrm>
+            <a:off x="3039247" y="2998232"/>
+            <a:ext cx="476113" cy="532368"/>
+          </a:xfrm>
+          <a:prstGeom prst="straightConnector1">
+            <a:avLst/>
+          </a:prstGeom>
+          <a:ln w="28575">
+            <a:tailEnd type="triangle"/>
+          </a:ln>
+        </p:spPr>
+        <p:style>
+          <a:lnRef idx="1">
+            <a:schemeClr val="accent1"/>
+          </a:lnRef>
+          <a:fillRef idx="0">
+            <a:schemeClr val="accent1"/>
+          </a:fillRef>
+          <a:effectRef idx="0">
+            <a:schemeClr val="accent1"/>
+          </a:effectRef>
+          <a:fontRef idx="minor">
+            <a:schemeClr val="tx1"/>
+          </a:fontRef>
+        </p:style>
+      </p:cxnSp>
+      <p:cxnSp>
+        <p:nvCxnSpPr>
+          <p:cNvPr id="24" name="Straight Arrow Connector 23">
+            <a:extLst>
+              <a:ext uri="{FF2B5EF4-FFF2-40B4-BE49-F238E27FC236}">
+                <a16:creationId xmlns:a16="http://schemas.microsoft.com/office/drawing/2014/main" id="{EB94EE1D-E322-0CDC-2713-F7A681F31AB6}"/>
+              </a:ext>
+            </a:extLst>
+          </p:cNvPr>
+          <p:cNvCxnSpPr/>
+          <p:nvPr/>
+        </p:nvCxnSpPr>
+        <p:spPr>
+          <a:xfrm flipV="1">
+            <a:off x="3119120" y="3667760"/>
+            <a:ext cx="396240" cy="701040"/>
+          </a:xfrm>
+          <a:prstGeom prst="straightConnector1">
+            <a:avLst/>
+          </a:prstGeom>
+          <a:ln w="28575">
+            <a:tailEnd type="triangle"/>
+          </a:ln>
+        </p:spPr>
+        <p:style>
+          <a:lnRef idx="1">
+            <a:schemeClr val="accent1"/>
+          </a:lnRef>
+          <a:fillRef idx="0">
+            <a:schemeClr val="accent1"/>
+          </a:fillRef>
+          <a:effectRef idx="0">
+            <a:schemeClr val="accent1"/>
+          </a:effectRef>
+          <a:fontRef idx="minor">
+            <a:schemeClr val="tx1"/>
+          </a:fontRef>
+        </p:style>
+      </p:cxnSp>
+      <p:cxnSp>
+        <p:nvCxnSpPr>
+          <p:cNvPr id="26" name="Straight Arrow Connector 25">
+            <a:extLst>
+              <a:ext uri="{FF2B5EF4-FFF2-40B4-BE49-F238E27FC236}">
+                <a16:creationId xmlns:a16="http://schemas.microsoft.com/office/drawing/2014/main" id="{5A87B0B5-DF29-0FCC-A6B8-0D9F7B16AA0D}"/>
+              </a:ext>
+            </a:extLst>
+          </p:cNvPr>
+          <p:cNvCxnSpPr>
+            <a:cxnSpLocks/>
+          </p:cNvCxnSpPr>
+          <p:nvPr/>
+        </p:nvCxnSpPr>
+        <p:spPr>
+          <a:xfrm>
+            <a:off x="3667760" y="3530600"/>
+            <a:ext cx="741680" cy="0"/>
+          </a:xfrm>
+          <a:prstGeom prst="straightConnector1">
+            <a:avLst/>
+          </a:prstGeom>
+          <a:ln w="28575">
+            <a:tailEnd type="triangle"/>
+          </a:ln>
+        </p:spPr>
+        <p:style>
+          <a:lnRef idx="1">
+            <a:schemeClr val="accent1"/>
+          </a:lnRef>
+          <a:fillRef idx="0">
+            <a:schemeClr val="accent1"/>
+          </a:fillRef>
+          <a:effectRef idx="0">
+            <a:schemeClr val="accent1"/>
+          </a:effectRef>
+          <a:fontRef idx="minor">
+            <a:schemeClr val="tx1"/>
+          </a:fontRef>
+        </p:style>
+      </p:cxnSp>
+      <p:cxnSp>
+        <p:nvCxnSpPr>
+          <p:cNvPr id="30" name="Straight Arrow Connector 29">
+            <a:extLst>
+              <a:ext uri="{FF2B5EF4-FFF2-40B4-BE49-F238E27FC236}">
+                <a16:creationId xmlns:a16="http://schemas.microsoft.com/office/drawing/2014/main" id="{55842FD6-99A8-2E8D-8952-B64337F498F2}"/>
+              </a:ext>
+            </a:extLst>
+          </p:cNvPr>
+          <p:cNvCxnSpPr/>
+          <p:nvPr/>
+        </p:nvCxnSpPr>
+        <p:spPr>
+          <a:xfrm>
+            <a:off x="6929120" y="3566160"/>
+            <a:ext cx="1224280" cy="0"/>
+          </a:xfrm>
+          <a:prstGeom prst="straightConnector1">
+            <a:avLst/>
+          </a:prstGeom>
+          <a:ln w="28575">
+            <a:tailEnd type="triangle"/>
+          </a:ln>
+        </p:spPr>
+        <p:style>
+          <a:lnRef idx="1">
+            <a:schemeClr val="accent1"/>
+          </a:lnRef>
+          <a:fillRef idx="0">
+            <a:schemeClr val="accent1"/>
+          </a:fillRef>
+          <a:effectRef idx="0">
+            <a:schemeClr val="accent1"/>
+          </a:effectRef>
+          <a:fontRef idx="minor">
+            <a:schemeClr val="tx1"/>
+          </a:fontRef>
+        </p:style>
+      </p:cxnSp>
+      <p:cxnSp>
+        <p:nvCxnSpPr>
+          <p:cNvPr id="35" name="Straight Arrow Connector 34">
+            <a:extLst>
+              <a:ext uri="{FF2B5EF4-FFF2-40B4-BE49-F238E27FC236}">
+                <a16:creationId xmlns:a16="http://schemas.microsoft.com/office/drawing/2014/main" id="{33B6115E-6479-DE74-D605-5665E69BC7F0}"/>
+              </a:ext>
+            </a:extLst>
+          </p:cNvPr>
+          <p:cNvCxnSpPr/>
+          <p:nvPr/>
+        </p:nvCxnSpPr>
+        <p:spPr>
+          <a:xfrm>
+            <a:off x="5669280" y="2032000"/>
+            <a:ext cx="0" cy="864632"/>
+          </a:xfrm>
+          <a:prstGeom prst="straightConnector1">
+            <a:avLst/>
+          </a:prstGeom>
+          <a:ln w="28575">
+            <a:headEnd type="triangle"/>
+            <a:tailEnd type="triangle"/>
+          </a:ln>
+        </p:spPr>
+        <p:style>
+          <a:lnRef idx="1">
+            <a:schemeClr val="accent1"/>
+          </a:lnRef>
+          <a:fillRef idx="0">
+            <a:schemeClr val="accent1"/>
+          </a:fillRef>
+          <a:effectRef idx="0">
+            <a:schemeClr val="accent1"/>
+          </a:effectRef>
+          <a:fontRef idx="minor">
+            <a:schemeClr val="tx1"/>
+          </a:fontRef>
+        </p:style>
+      </p:cxnSp>
+      <p:sp>
+        <p:nvSpPr>
+          <p:cNvPr id="37" name="Rectangle: Rounded Corners 36">
+            <a:extLst>
+              <a:ext uri="{FF2B5EF4-FFF2-40B4-BE49-F238E27FC236}">
+                <a16:creationId xmlns:a16="http://schemas.microsoft.com/office/drawing/2014/main" id="{D1FD724F-7BDC-E8C7-CD15-AB9026C2BE1B}"/>
+              </a:ext>
+            </a:extLst>
+          </p:cNvPr>
+          <p:cNvSpPr/>
+          <p:nvPr/>
+        </p:nvSpPr>
+        <p:spPr>
+          <a:xfrm>
+            <a:off x="4653700" y="3091659"/>
+            <a:ext cx="1973184" cy="949002"/>
+          </a:xfrm>
+          <a:prstGeom prst="roundRect">
+            <a:avLst/>
+          </a:prstGeom>
+          <a:solidFill>
+            <a:schemeClr val="bg1"/>
+          </a:solidFill>
+          <a:ln w="38100">
+            <a:solidFill>
+              <a:schemeClr val="tx1"/>
+            </a:solidFill>
+          </a:ln>
+        </p:spPr>
+        <p:style>
+          <a:lnRef idx="2">
+            <a:schemeClr val="accent1">
+              <a:shade val="50000"/>
+            </a:schemeClr>
+          </a:lnRef>
+          <a:fillRef idx="1">
+            <a:schemeClr val="accent1"/>
+          </a:fillRef>
+          <a:effectRef idx="0">
+            <a:schemeClr val="accent1"/>
+          </a:effectRef>
+          <a:fontRef idx="minor">
+            <a:schemeClr val="lt1"/>
+          </a:fontRef>
+        </p:style>
+        <p:txBody>
+          <a:bodyPr rtlCol="0" anchor="ctr"/>
+          <a:lstStyle/>
+          <a:p>
+            <a:pPr algn="ctr"/>
+            <a:r>
+              <a:rPr lang="en-US" b="1" dirty="0">
+                <a:solidFill>
+                  <a:schemeClr val="tx1"/>
+                </a:solidFill>
+              </a:rPr>
+              <a:t>R Code</a:t>
+            </a:r>
+          </a:p>
+        </p:txBody>
+      </p:sp>
     </p:spTree>
     <p:extLst>
       <p:ext uri="{BB962C8B-B14F-4D97-AF65-F5344CB8AC3E}">
-        <p14:creationId xmlns:p14="http://schemas.microsoft.com/office/powerpoint/2010/main" val="3532666715"/>
+        <p14:creationId xmlns:p14="http://schemas.microsoft.com/office/powerpoint/2010/main" val="2478564143"/>
       </p:ext>
     </p:extLst>
   </p:cSld>
@@ -14500,7 +14666,7 @@
           <a:p>
             <a:r>
               <a:rPr lang="en-US" dirty="0"/>
-              <a:t>Other Use Cases</a:t>
+              <a:t>Process</a:t>
             </a:r>
           </a:p>
         </p:txBody>
@@ -14533,7 +14699,7 @@
           <a:p>
             <a:r>
               <a:rPr lang="en-US" dirty="0"/>
-              <a:t>Text Summarization</a:t>
+              <a:t>Read in your text</a:t>
             </a:r>
           </a:p>
         </p:txBody>
@@ -14568,17 +14734,14 @@
           <a:p>
             <a:r>
               <a:rPr lang="en-US" dirty="0"/>
-              <a:t>Summarize this text</a:t>
+              <a:t>Get your text from your .csv file, API, etc.</a:t>
             </a:r>
           </a:p>
           <a:p>
             <a:r>
               <a:rPr lang="en-US" dirty="0"/>
-              <a:t>Summarize this candidate’s software development background</a:t>
-            </a:r>
-          </a:p>
-          <a:p>
-            <a:endParaRPr lang="en-US" dirty="0"/>
+              <a:t>Concatenate it with your prompt</a:t>
+            </a:r>
           </a:p>
         </p:txBody>
       </p:sp>
@@ -14610,7 +14773,15 @@
           <a:p>
             <a:r>
               <a:rPr lang="en-US" dirty="0"/>
-              <a:t>Classification</a:t>
+              <a:t>Use With </a:t>
+            </a:r>
+            <a:r>
+              <a:rPr lang="en-US" dirty="0" err="1"/>
+              <a:t>ChatGPT</a:t>
+            </a:r>
+            <a:r>
+              <a:rPr lang="en-US" dirty="0"/>
+              <a:t> API</a:t>
             </a:r>
           </a:p>
         </p:txBody>
@@ -14645,13 +14816,19 @@
           <a:p>
             <a:r>
               <a:rPr lang="en-US" dirty="0"/>
-              <a:t>Is this job a ‘data science’ job?</a:t>
+              <a:t>Sending a block of text</a:t>
             </a:r>
           </a:p>
           <a:p>
             <a:r>
               <a:rPr lang="en-US" dirty="0"/>
-              <a:t>What topics is this text about?</a:t>
+              <a:t>Getting back a result</a:t>
+            </a:r>
+          </a:p>
+          <a:p>
+            <a:r>
+              <a:rPr lang="en-US" dirty="0"/>
+              <a:t>Putting in a table/data frame</a:t>
             </a:r>
           </a:p>
           <a:p>
@@ -14687,7 +14864,7 @@
           <a:p>
             <a:r>
               <a:rPr lang="en-US" dirty="0"/>
-              <a:t>Named Entity Recognition</a:t>
+              <a:t>Evaluate the Results</a:t>
             </a:r>
           </a:p>
         </p:txBody>
@@ -14720,13 +14897,13 @@
           <a:p>
             <a:r>
               <a:rPr lang="en-US" dirty="0"/>
-              <a:t>What tools and software are in this job listing?</a:t>
+              <a:t>Informally: does it look like you want?</a:t>
             </a:r>
           </a:p>
           <a:p>
             <a:r>
               <a:rPr lang="en-US" dirty="0"/>
-              <a:t>What locations are mentioned on this resume?</a:t>
+              <a:t>Formally: via comparing with your ‘labeled’ data and using metrics like a confusion matrix</a:t>
             </a:r>
           </a:p>
         </p:txBody>
@@ -14843,7 +15020,7 @@
     </p:spTree>
     <p:extLst>
       <p:ext uri="{BB962C8B-B14F-4D97-AF65-F5344CB8AC3E}">
-        <p14:creationId xmlns:p14="http://schemas.microsoft.com/office/powerpoint/2010/main" val="2721508595"/>
+        <p14:creationId xmlns:p14="http://schemas.microsoft.com/office/powerpoint/2010/main" val="3532666715"/>
       </p:ext>
     </p:extLst>
   </p:cSld>
@@ -14875,6 +15052,404 @@
           <p:cNvPr id="2" name="Title 1">
             <a:extLst>
               <a:ext uri="{FF2B5EF4-FFF2-40B4-BE49-F238E27FC236}">
+                <a16:creationId xmlns:a16="http://schemas.microsoft.com/office/drawing/2014/main" id="{E5F191A4-7839-4F63-B17C-7C366C59488C}"/>
+              </a:ext>
+            </a:extLst>
+          </p:cNvPr>
+          <p:cNvSpPr>
+            <a:spLocks noGrp="1"/>
+          </p:cNvSpPr>
+          <p:nvPr>
+            <p:ph type="title"/>
+          </p:nvPr>
+        </p:nvSpPr>
+        <p:spPr>
+          <a:xfrm>
+            <a:off x="1167492" y="381000"/>
+            <a:ext cx="9779183" cy="1325563"/>
+          </a:xfrm>
+        </p:spPr>
+        <p:txBody>
+          <a:bodyPr/>
+          <a:lstStyle/>
+          <a:p>
+            <a:r>
+              <a:rPr lang="en-US" dirty="0"/>
+              <a:t>Other Use Cases</a:t>
+            </a:r>
+          </a:p>
+        </p:txBody>
+      </p:sp>
+      <p:sp>
+        <p:nvSpPr>
+          <p:cNvPr id="9" name="Content Placeholder 8">
+            <a:extLst>
+              <a:ext uri="{FF2B5EF4-FFF2-40B4-BE49-F238E27FC236}">
+                <a16:creationId xmlns:a16="http://schemas.microsoft.com/office/drawing/2014/main" id="{472FA7B1-CD7F-3646-B44C-91A107A0CBEE}"/>
+              </a:ext>
+            </a:extLst>
+          </p:cNvPr>
+          <p:cNvSpPr>
+            <a:spLocks noGrp="1"/>
+          </p:cNvSpPr>
+          <p:nvPr>
+            <p:ph idx="11"/>
+          </p:nvPr>
+        </p:nvSpPr>
+        <p:spPr>
+          <a:xfrm>
+            <a:off x="1167493" y="2003804"/>
+            <a:ext cx="3173278" cy="522514"/>
+          </a:xfrm>
+        </p:spPr>
+        <p:txBody>
+          <a:bodyPr/>
+          <a:lstStyle/>
+          <a:p>
+            <a:r>
+              <a:rPr lang="en-US" dirty="0"/>
+              <a:t>Text Summarization</a:t>
+            </a:r>
+          </a:p>
+        </p:txBody>
+      </p:sp>
+      <p:sp>
+        <p:nvSpPr>
+          <p:cNvPr id="4" name="Content Placeholder 3">
+            <a:extLst>
+              <a:ext uri="{FF2B5EF4-FFF2-40B4-BE49-F238E27FC236}">
+                <a16:creationId xmlns:a16="http://schemas.microsoft.com/office/drawing/2014/main" id="{9B9ED227-95A7-4B08-91FE-5E0EF0D41D20}"/>
+              </a:ext>
+            </a:extLst>
+          </p:cNvPr>
+          <p:cNvSpPr>
+            <a:spLocks noGrp="1"/>
+          </p:cNvSpPr>
+          <p:nvPr>
+            <p:ph idx="1"/>
+          </p:nvPr>
+        </p:nvSpPr>
+        <p:spPr>
+          <a:xfrm>
+            <a:off x="1167491" y="2526318"/>
+            <a:ext cx="3218688" cy="2828613"/>
+          </a:xfrm>
+        </p:spPr>
+        <p:txBody>
+          <a:bodyPr vert="horz" lIns="91440" tIns="45720" rIns="91440" bIns="45720" rtlCol="0" anchor="t">
+            <a:noAutofit/>
+          </a:bodyPr>
+          <a:lstStyle/>
+          <a:p>
+            <a:r>
+              <a:rPr lang="en-US" dirty="0"/>
+              <a:t>Summarize this text</a:t>
+            </a:r>
+          </a:p>
+          <a:p>
+            <a:r>
+              <a:rPr lang="en-US" dirty="0"/>
+              <a:t>Summarize this candidate’s software development background</a:t>
+            </a:r>
+          </a:p>
+          <a:p>
+            <a:endParaRPr lang="en-US" dirty="0"/>
+          </a:p>
+        </p:txBody>
+      </p:sp>
+      <p:sp>
+        <p:nvSpPr>
+          <p:cNvPr id="10" name="Content Placeholder 9">
+            <a:extLst>
+              <a:ext uri="{FF2B5EF4-FFF2-40B4-BE49-F238E27FC236}">
+                <a16:creationId xmlns:a16="http://schemas.microsoft.com/office/drawing/2014/main" id="{585697B7-EBBB-0E4B-AA02-0D3F94821C6E}"/>
+              </a:ext>
+            </a:extLst>
+          </p:cNvPr>
+          <p:cNvSpPr>
+            <a:spLocks noGrp="1"/>
+          </p:cNvSpPr>
+          <p:nvPr>
+            <p:ph idx="12"/>
+          </p:nvPr>
+        </p:nvSpPr>
+        <p:spPr>
+          <a:xfrm>
+            <a:off x="4683788" y="2003804"/>
+            <a:ext cx="3173278" cy="522514"/>
+          </a:xfrm>
+        </p:spPr>
+        <p:txBody>
+          <a:bodyPr/>
+          <a:lstStyle/>
+          <a:p>
+            <a:r>
+              <a:rPr lang="en-US" dirty="0"/>
+              <a:t>Classification</a:t>
+            </a:r>
+          </a:p>
+        </p:txBody>
+      </p:sp>
+      <p:sp>
+        <p:nvSpPr>
+          <p:cNvPr id="5" name="Content Placeholder 4">
+            <a:extLst>
+              <a:ext uri="{FF2B5EF4-FFF2-40B4-BE49-F238E27FC236}">
+                <a16:creationId xmlns:a16="http://schemas.microsoft.com/office/drawing/2014/main" id="{9C2ECAAA-1E9C-4845-8EA9-E11A76F08150}"/>
+              </a:ext>
+            </a:extLst>
+          </p:cNvPr>
+          <p:cNvSpPr>
+            <a:spLocks noGrp="1"/>
+          </p:cNvSpPr>
+          <p:nvPr>
+            <p:ph idx="10"/>
+          </p:nvPr>
+        </p:nvSpPr>
+        <p:spPr>
+          <a:xfrm>
+            <a:off x="4683787" y="2526318"/>
+            <a:ext cx="3173279" cy="2828613"/>
+          </a:xfrm>
+        </p:spPr>
+        <p:txBody>
+          <a:bodyPr vert="horz" lIns="91440" tIns="45720" rIns="91440" bIns="45720" rtlCol="0" anchor="t">
+            <a:normAutofit/>
+          </a:bodyPr>
+          <a:lstStyle/>
+          <a:p>
+            <a:r>
+              <a:rPr lang="en-US" dirty="0"/>
+              <a:t>Is this job a ‘data science’ job?</a:t>
+            </a:r>
+          </a:p>
+          <a:p>
+            <a:r>
+              <a:rPr lang="en-US" dirty="0"/>
+              <a:t>What topics is this text about?</a:t>
+            </a:r>
+          </a:p>
+          <a:p>
+            <a:endParaRPr lang="en-US" dirty="0"/>
+          </a:p>
+        </p:txBody>
+      </p:sp>
+      <p:sp>
+        <p:nvSpPr>
+          <p:cNvPr id="13" name="Content Placeholder 12">
+            <a:extLst>
+              <a:ext uri="{FF2B5EF4-FFF2-40B4-BE49-F238E27FC236}">
+                <a16:creationId xmlns:a16="http://schemas.microsoft.com/office/drawing/2014/main" id="{EB1FFBC5-1733-5E4A-BF11-2C157D9917CC}"/>
+              </a:ext>
+            </a:extLst>
+          </p:cNvPr>
+          <p:cNvSpPr>
+            <a:spLocks noGrp="1"/>
+          </p:cNvSpPr>
+          <p:nvPr>
+            <p:ph idx="14"/>
+          </p:nvPr>
+        </p:nvSpPr>
+        <p:spPr>
+          <a:xfrm>
+            <a:off x="8200082" y="2003804"/>
+            <a:ext cx="3839518" cy="522514"/>
+          </a:xfrm>
+        </p:spPr>
+        <p:txBody>
+          <a:bodyPr/>
+          <a:lstStyle/>
+          <a:p>
+            <a:r>
+              <a:rPr lang="en-US" dirty="0"/>
+              <a:t>Named Entity Recognition</a:t>
+            </a:r>
+          </a:p>
+        </p:txBody>
+      </p:sp>
+      <p:sp>
+        <p:nvSpPr>
+          <p:cNvPr id="11" name="Content Placeholder 10">
+            <a:extLst>
+              <a:ext uri="{FF2B5EF4-FFF2-40B4-BE49-F238E27FC236}">
+                <a16:creationId xmlns:a16="http://schemas.microsoft.com/office/drawing/2014/main" id="{48A12450-9474-8A49-BAEB-20C6F51540D5}"/>
+              </a:ext>
+            </a:extLst>
+          </p:cNvPr>
+          <p:cNvSpPr>
+            <a:spLocks noGrp="1"/>
+          </p:cNvSpPr>
+          <p:nvPr>
+            <p:ph idx="13"/>
+          </p:nvPr>
+        </p:nvSpPr>
+        <p:spPr>
+          <a:xfrm>
+            <a:off x="8200082" y="2526318"/>
+            <a:ext cx="3173279" cy="2828613"/>
+          </a:xfrm>
+        </p:spPr>
+        <p:txBody>
+          <a:bodyPr/>
+          <a:lstStyle/>
+          <a:p>
+            <a:r>
+              <a:rPr lang="en-US" dirty="0"/>
+              <a:t>What tools and software are in this job listing?</a:t>
+            </a:r>
+          </a:p>
+          <a:p>
+            <a:r>
+              <a:rPr lang="en-US" dirty="0"/>
+              <a:t>What locations are mentioned on this resume?</a:t>
+            </a:r>
+          </a:p>
+        </p:txBody>
+      </p:sp>
+      <p:sp>
+        <p:nvSpPr>
+          <p:cNvPr id="3" name="Date Placeholder 2">
+            <a:extLst>
+              <a:ext uri="{FF2B5EF4-FFF2-40B4-BE49-F238E27FC236}">
+                <a16:creationId xmlns:a16="http://schemas.microsoft.com/office/drawing/2014/main" id="{75202033-17DD-3E4F-BB90-ADC6A1F0C66F}"/>
+              </a:ext>
+            </a:extLst>
+          </p:cNvPr>
+          <p:cNvSpPr>
+            <a:spLocks noGrp="1"/>
+          </p:cNvSpPr>
+          <p:nvPr>
+            <p:ph type="dt" sz="half" idx="2"/>
+          </p:nvPr>
+        </p:nvSpPr>
+        <p:spPr>
+          <a:xfrm>
+            <a:off x="381000" y="6356350"/>
+            <a:ext cx="1767114" cy="365125"/>
+          </a:xfrm>
+        </p:spPr>
+        <p:txBody>
+          <a:bodyPr/>
+          <a:lstStyle/>
+          <a:p>
+            <a:r>
+              <a:rPr lang="en-US" dirty="0"/>
+              <a:t>6/28/2023</a:t>
+            </a:r>
+          </a:p>
+        </p:txBody>
+      </p:sp>
+      <p:sp>
+        <p:nvSpPr>
+          <p:cNvPr id="7" name="Footer Placeholder 6">
+            <a:extLst>
+              <a:ext uri="{FF2B5EF4-FFF2-40B4-BE49-F238E27FC236}">
+                <a16:creationId xmlns:a16="http://schemas.microsoft.com/office/drawing/2014/main" id="{B42ACFC2-B54A-8244-B5D9-4B1EC2EED59D}"/>
+              </a:ext>
+            </a:extLst>
+          </p:cNvPr>
+          <p:cNvSpPr>
+            <a:spLocks noGrp="1"/>
+          </p:cNvSpPr>
+          <p:nvPr>
+            <p:ph type="ftr" sz="quarter" idx="3"/>
+          </p:nvPr>
+        </p:nvSpPr>
+        <p:spPr>
+          <a:xfrm>
+            <a:off x="4038600" y="6356350"/>
+            <a:ext cx="4114800" cy="365125"/>
+          </a:xfrm>
+        </p:spPr>
+        <p:txBody>
+          <a:bodyPr/>
+          <a:lstStyle/>
+          <a:p>
+            <a:r>
+              <a:rPr lang="en-US" dirty="0"/>
+              <a:t>Using the </a:t>
+            </a:r>
+            <a:r>
+              <a:rPr lang="en-US" dirty="0" err="1"/>
+              <a:t>ChatGPT</a:t>
+            </a:r>
+            <a:r>
+              <a:rPr lang="en-US" dirty="0"/>
+              <a:t> API in R</a:t>
+            </a:r>
+          </a:p>
+        </p:txBody>
+      </p:sp>
+      <p:sp>
+        <p:nvSpPr>
+          <p:cNvPr id="8" name="Slide Number Placeholder 7">
+            <a:extLst>
+              <a:ext uri="{FF2B5EF4-FFF2-40B4-BE49-F238E27FC236}">
+                <a16:creationId xmlns:a16="http://schemas.microsoft.com/office/drawing/2014/main" id="{B609FC03-B5BE-D846-993A-8E351C9509F3}"/>
+              </a:ext>
+            </a:extLst>
+          </p:cNvPr>
+          <p:cNvSpPr>
+            <a:spLocks noGrp="1"/>
+          </p:cNvSpPr>
+          <p:nvPr>
+            <p:ph type="sldNum" sz="quarter" idx="4"/>
+          </p:nvPr>
+        </p:nvSpPr>
+        <p:spPr>
+          <a:xfrm>
+            <a:off x="10153276" y="6356350"/>
+            <a:ext cx="1657723" cy="365125"/>
+          </a:xfrm>
+        </p:spPr>
+        <p:txBody>
+          <a:bodyPr/>
+          <a:lstStyle/>
+          <a:p>
+            <a:fld id="{294A09A9-5501-47C1-A89A-A340965A2BE2}" type="slidenum">
+              <a:rPr lang="en-US" smtClean="0"/>
+              <a:pPr/>
+              <a:t>7</a:t>
+            </a:fld>
+            <a:endParaRPr lang="en-US" dirty="0"/>
+          </a:p>
+        </p:txBody>
+      </p:sp>
+    </p:spTree>
+    <p:extLst>
+      <p:ext uri="{BB962C8B-B14F-4D97-AF65-F5344CB8AC3E}">
+        <p14:creationId xmlns:p14="http://schemas.microsoft.com/office/powerpoint/2010/main" val="2721508595"/>
+      </p:ext>
+    </p:extLst>
+  </p:cSld>
+  <p:clrMapOvr>
+    <a:masterClrMapping/>
+  </p:clrMapOvr>
+</p:sld>
+</file>
+
+<file path=ppt/slides/slide8.xml><?xml version="1.0" encoding="utf-8"?>
+<p:sld xmlns:a="http://schemas.openxmlformats.org/drawingml/2006/main" xmlns:r="http://schemas.openxmlformats.org/officeDocument/2006/relationships" xmlns:p="http://schemas.openxmlformats.org/presentationml/2006/main">
+  <p:cSld>
+    <p:spTree>
+      <p:nvGrpSpPr>
+        <p:cNvPr id="1" name=""/>
+        <p:cNvGrpSpPr/>
+        <p:nvPr/>
+      </p:nvGrpSpPr>
+      <p:grpSpPr>
+        <a:xfrm>
+          <a:off x="0" y="0"/>
+          <a:ext cx="0" cy="0"/>
+          <a:chOff x="0" y="0"/>
+          <a:chExt cx="0" cy="0"/>
+        </a:xfrm>
+      </p:grpSpPr>
+      <p:sp>
+        <p:nvSpPr>
+          <p:cNvPr id="2" name="Title 1">
+            <a:extLst>
+              <a:ext uri="{FF2B5EF4-FFF2-40B4-BE49-F238E27FC236}">
                 <a16:creationId xmlns:a16="http://schemas.microsoft.com/office/drawing/2014/main" id="{42D1A202-23A3-4F3A-AA92-0172C8D2DA06}"/>
               </a:ext>
             </a:extLst>
@@ -15056,7 +15631,7 @@
             <a:fld id="{294A09A9-5501-47C1-A89A-A340965A2BE2}" type="slidenum">
               <a:rPr lang="en-US" smtClean="0"/>
               <a:pPr/>
-              <a:t>7</a:t>
+              <a:t>8</a:t>
             </a:fld>
             <a:endParaRPr lang="en-US" dirty="0"/>
           </a:p>
@@ -15572,6 +16147,15 @@
 </file>
 
 <file path=customXml/item1.xml><?xml version="1.0" encoding="utf-8"?>
+<?mso-contentType ?>
+<FormTemplates xmlns="http://schemas.microsoft.com/sharepoint/v3/contenttype/forms">
+  <Display>DocumentLibraryForm</Display>
+  <Edit>DocumentLibraryForm</Edit>
+  <New>DocumentLibraryForm</New>
+</FormTemplates>
+</file>
+
+<file path=customXml/item2.xml><?xml version="1.0" encoding="utf-8"?>
 <p:properties xmlns:p="http://schemas.microsoft.com/office/2006/metadata/properties" xmlns:xsi="http://www.w3.org/2001/XMLSchema-instance" xmlns:pc="http://schemas.microsoft.com/office/infopath/2007/PartnerControls">
   <documentManagement>
     <_ip_UnifiedCompliancePolicyUIAction xmlns="http://schemas.microsoft.com/sharepoint/v3" xsi:nil="true"/>
@@ -15588,15 +16172,6 @@
     <MediaServiceKeyPoints xmlns="71af3243-3dd4-4a8d-8c0d-dd76da1f02a5" xsi:nil="true"/>
   </documentManagement>
 </p:properties>
-</file>
-
-<file path=customXml/item2.xml><?xml version="1.0" encoding="utf-8"?>
-<?mso-contentType ?>
-<FormTemplates xmlns="http://schemas.microsoft.com/sharepoint/v3/contenttype/forms">
-  <Display>DocumentLibraryForm</Display>
-  <Edit>DocumentLibraryForm</Edit>
-  <New>DocumentLibraryForm</New>
-</FormTemplates>
 </file>
 
 <file path=customXml/item3.xml><?xml version="1.0" encoding="utf-8"?>
@@ -15882,6 +16457,14 @@
 </file>
 
 <file path=customXml/itemProps1.xml><?xml version="1.0" encoding="utf-8"?>
+<ds:datastoreItem xmlns:ds="http://schemas.openxmlformats.org/officeDocument/2006/customXml" ds:itemID="{85334180-0405-413B-834A-44FA9E05ADB7}">
+  <ds:schemaRefs>
+    <ds:schemaRef ds:uri="http://schemas.microsoft.com/sharepoint/v3/contenttype/forms"/>
+  </ds:schemaRefs>
+</ds:datastoreItem>
+</file>
+
+<file path=customXml/itemProps2.xml><?xml version="1.0" encoding="utf-8"?>
 <ds:datastoreItem xmlns:ds="http://schemas.openxmlformats.org/officeDocument/2006/customXml" ds:itemID="{4D5BAB77-79E1-4739-AA51-10C9079186D6}">
   <ds:schemaRefs>
     <ds:schemaRef ds:uri="http://schemas.microsoft.com/office/2006/metadata/properties"/>
@@ -15889,14 +16472,6 @@
     <ds:schemaRef ds:uri="http://schemas.microsoft.com/sharepoint/v3"/>
     <ds:schemaRef ds:uri="71af3243-3dd4-4a8d-8c0d-dd76da1f02a5"/>
     <ds:schemaRef ds:uri="230e9df3-be65-4c73-a93b-d1236ebd677e"/>
-  </ds:schemaRefs>
-</ds:datastoreItem>
-</file>
-
-<file path=customXml/itemProps2.xml><?xml version="1.0" encoding="utf-8"?>
-<ds:datastoreItem xmlns:ds="http://schemas.openxmlformats.org/officeDocument/2006/customXml" ds:itemID="{85334180-0405-413B-834A-44FA9E05ADB7}">
-  <ds:schemaRefs>
-    <ds:schemaRef ds:uri="http://schemas.microsoft.com/sharepoint/v3/contenttype/forms"/>
   </ds:schemaRefs>
 </ds:datastoreItem>
 </file>

</xml_diff>